<commit_message>
working on ex06 and other minor fixes
</commit_message>
<xml_diff>
--- a/doc/intro/slides/lesson_02_jpa.pptx
+++ b/doc/intro/slides/lesson_02_jpa.pptx
@@ -204,7 +204,7 @@
           <a:p>
             <a:fld id="{9B5B52BA-3295-0343-9E28-A260A811DD10}" type="datetimeFigureOut">
               <a:rPr lang="en-US" smtClean="0"/>
-              <a:t>12/26/17</a:t>
+              <a:t>12/27/17</a:t>
             </a:fld>
             <a:endParaRPr lang="en-US"/>
           </a:p>
@@ -603,7 +603,7 @@
           <a:p>
             <a:fld id="{04F1D4A2-813C-F741-B481-C92B3A596030}" type="datetimeFigureOut">
               <a:rPr lang="en-US" smtClean="0"/>
-              <a:t>12/26/17</a:t>
+              <a:t>12/27/17</a:t>
             </a:fld>
             <a:endParaRPr lang="en-US"/>
           </a:p>
@@ -773,7 +773,7 @@
           <a:p>
             <a:fld id="{04F1D4A2-813C-F741-B481-C92B3A596030}" type="datetimeFigureOut">
               <a:rPr lang="en-US" smtClean="0"/>
-              <a:t>12/26/17</a:t>
+              <a:t>12/27/17</a:t>
             </a:fld>
             <a:endParaRPr lang="en-US"/>
           </a:p>
@@ -953,7 +953,7 @@
           <a:p>
             <a:fld id="{04F1D4A2-813C-F741-B481-C92B3A596030}" type="datetimeFigureOut">
               <a:rPr lang="en-US" smtClean="0"/>
-              <a:t>12/26/17</a:t>
+              <a:t>12/27/17</a:t>
             </a:fld>
             <a:endParaRPr lang="en-US"/>
           </a:p>
@@ -1134,7 +1134,7 @@
           <a:p>
             <a:fld id="{04F1D4A2-813C-F741-B481-C92B3A596030}" type="datetimeFigureOut">
               <a:rPr lang="en-US" smtClean="0"/>
-              <a:t>12/26/17</a:t>
+              <a:t>12/27/17</a:t>
             </a:fld>
             <a:endParaRPr lang="en-US"/>
           </a:p>
@@ -1380,7 +1380,7 @@
           <a:p>
             <a:fld id="{04F1D4A2-813C-F741-B481-C92B3A596030}" type="datetimeFigureOut">
               <a:rPr lang="en-US" smtClean="0"/>
-              <a:t>12/26/17</a:t>
+              <a:t>12/27/17</a:t>
             </a:fld>
             <a:endParaRPr lang="en-US"/>
           </a:p>
@@ -1612,7 +1612,7 @@
           <a:p>
             <a:fld id="{04F1D4A2-813C-F741-B481-C92B3A596030}" type="datetimeFigureOut">
               <a:rPr lang="en-US" smtClean="0"/>
-              <a:t>12/26/17</a:t>
+              <a:t>12/27/17</a:t>
             </a:fld>
             <a:endParaRPr lang="en-US"/>
           </a:p>
@@ -1979,7 +1979,7 @@
           <a:p>
             <a:fld id="{04F1D4A2-813C-F741-B481-C92B3A596030}" type="datetimeFigureOut">
               <a:rPr lang="en-US" smtClean="0"/>
-              <a:t>12/26/17</a:t>
+              <a:t>12/27/17</a:t>
             </a:fld>
             <a:endParaRPr lang="en-US"/>
           </a:p>
@@ -2097,7 +2097,7 @@
           <a:p>
             <a:fld id="{04F1D4A2-813C-F741-B481-C92B3A596030}" type="datetimeFigureOut">
               <a:rPr lang="en-US" smtClean="0"/>
-              <a:t>12/26/17</a:t>
+              <a:t>12/27/17</a:t>
             </a:fld>
             <a:endParaRPr lang="en-US"/>
           </a:p>
@@ -2192,7 +2192,7 @@
           <a:p>
             <a:fld id="{04F1D4A2-813C-F741-B481-C92B3A596030}" type="datetimeFigureOut">
               <a:rPr lang="en-US" smtClean="0"/>
-              <a:t>12/26/17</a:t>
+              <a:t>12/27/17</a:t>
             </a:fld>
             <a:endParaRPr lang="en-US"/>
           </a:p>
@@ -2469,7 +2469,7 @@
           <a:p>
             <a:fld id="{04F1D4A2-813C-F741-B481-C92B3A596030}" type="datetimeFigureOut">
               <a:rPr lang="en-US" smtClean="0"/>
-              <a:t>12/26/17</a:t>
+              <a:t>12/27/17</a:t>
             </a:fld>
             <a:endParaRPr lang="en-US"/>
           </a:p>
@@ -2722,7 +2722,7 @@
           <a:p>
             <a:fld id="{04F1D4A2-813C-F741-B481-C92B3A596030}" type="datetimeFigureOut">
               <a:rPr lang="en-US" smtClean="0"/>
-              <a:t>12/26/17</a:t>
+              <a:t>12/27/17</a:t>
             </a:fld>
             <a:endParaRPr lang="en-US"/>
           </a:p>
@@ -2935,7 +2935,7 @@
           <a:p>
             <a:fld id="{04F1D4A2-813C-F741-B481-C92B3A596030}" type="datetimeFigureOut">
               <a:rPr lang="en-US" smtClean="0"/>
-              <a:t>12/26/17</a:t>
+              <a:t>12/27/17</a:t>
             </a:fld>
             <a:endParaRPr lang="en-US"/>
           </a:p>
@@ -4704,10 +4704,10 @@
           <p:nvPr/>
         </p:nvPicPr>
         <p:blipFill>
-          <a:blip r:embed="rId2">
+          <a:blip r:embed="rId2" cstate="screen">
             <a:extLst>
               <a:ext uri="{28A0092B-C50C-407E-A947-70E740481C1C}">
-                <a14:useLocalDpi xmlns:a14="http://schemas.microsoft.com/office/drawing/2010/main" val="0"/>
+                <a14:useLocalDpi xmlns:a14="http://schemas.microsoft.com/office/drawing/2010/main"/>
               </a:ext>
             </a:extLst>
           </a:blip>
@@ -4737,7 +4737,7 @@
           <a:blip r:embed="rId3">
             <a:extLst>
               <a:ext uri="{28A0092B-C50C-407E-A947-70E740481C1C}">
-                <a14:useLocalDpi xmlns:a14="http://schemas.microsoft.com/office/drawing/2010/main" val="0"/>
+                <a14:useLocalDpi xmlns:a14="http://schemas.microsoft.com/office/drawing/2010/main"/>
               </a:ext>
             </a:extLst>
           </a:blip>

</xml_diff>

<commit_message>
working on les 2
</commit_message>
<xml_diff>
--- a/doc/intro/slides/lesson_02_jpa.pptx
+++ b/doc/intro/slides/lesson_02_jpa.pptx
@@ -204,7 +204,7 @@
           <a:p>
             <a:fld id="{9B5B52BA-3295-0343-9E28-A260A811DD10}" type="datetimeFigureOut">
               <a:rPr lang="en-US" smtClean="0"/>
-              <a:t>12/27/17</a:t>
+              <a:t>26-Nov-18</a:t>
             </a:fld>
             <a:endParaRPr lang="en-US"/>
           </a:p>
@@ -603,7 +603,7 @@
           <a:p>
             <a:fld id="{04F1D4A2-813C-F741-B481-C92B3A596030}" type="datetimeFigureOut">
               <a:rPr lang="en-US" smtClean="0"/>
-              <a:t>12/27/17</a:t>
+              <a:t>26-Nov-18</a:t>
             </a:fld>
             <a:endParaRPr lang="en-US"/>
           </a:p>
@@ -773,7 +773,7 @@
           <a:p>
             <a:fld id="{04F1D4A2-813C-F741-B481-C92B3A596030}" type="datetimeFigureOut">
               <a:rPr lang="en-US" smtClean="0"/>
-              <a:t>12/27/17</a:t>
+              <a:t>26-Nov-18</a:t>
             </a:fld>
             <a:endParaRPr lang="en-US"/>
           </a:p>
@@ -953,7 +953,7 @@
           <a:p>
             <a:fld id="{04F1D4A2-813C-F741-B481-C92B3A596030}" type="datetimeFigureOut">
               <a:rPr lang="en-US" smtClean="0"/>
-              <a:t>12/27/17</a:t>
+              <a:t>26-Nov-18</a:t>
             </a:fld>
             <a:endParaRPr lang="en-US"/>
           </a:p>
@@ -1134,7 +1134,7 @@
           <a:p>
             <a:fld id="{04F1D4A2-813C-F741-B481-C92B3A596030}" type="datetimeFigureOut">
               <a:rPr lang="en-US" smtClean="0"/>
-              <a:t>12/27/17</a:t>
+              <a:t>26-Nov-18</a:t>
             </a:fld>
             <a:endParaRPr lang="en-US"/>
           </a:p>
@@ -1380,7 +1380,7 @@
           <a:p>
             <a:fld id="{04F1D4A2-813C-F741-B481-C92B3A596030}" type="datetimeFigureOut">
               <a:rPr lang="en-US" smtClean="0"/>
-              <a:t>12/27/17</a:t>
+              <a:t>26-Nov-18</a:t>
             </a:fld>
             <a:endParaRPr lang="en-US"/>
           </a:p>
@@ -1612,7 +1612,7 @@
           <a:p>
             <a:fld id="{04F1D4A2-813C-F741-B481-C92B3A596030}" type="datetimeFigureOut">
               <a:rPr lang="en-US" smtClean="0"/>
-              <a:t>12/27/17</a:t>
+              <a:t>26-Nov-18</a:t>
             </a:fld>
             <a:endParaRPr lang="en-US"/>
           </a:p>
@@ -1979,7 +1979,7 @@
           <a:p>
             <a:fld id="{04F1D4A2-813C-F741-B481-C92B3A596030}" type="datetimeFigureOut">
               <a:rPr lang="en-US" smtClean="0"/>
-              <a:t>12/27/17</a:t>
+              <a:t>26-Nov-18</a:t>
             </a:fld>
             <a:endParaRPr lang="en-US"/>
           </a:p>
@@ -2097,7 +2097,7 @@
           <a:p>
             <a:fld id="{04F1D4A2-813C-F741-B481-C92B3A596030}" type="datetimeFigureOut">
               <a:rPr lang="en-US" smtClean="0"/>
-              <a:t>12/27/17</a:t>
+              <a:t>26-Nov-18</a:t>
             </a:fld>
             <a:endParaRPr lang="en-US"/>
           </a:p>
@@ -2192,7 +2192,7 @@
           <a:p>
             <a:fld id="{04F1D4A2-813C-F741-B481-C92B3A596030}" type="datetimeFigureOut">
               <a:rPr lang="en-US" smtClean="0"/>
-              <a:t>12/27/17</a:t>
+              <a:t>26-Nov-18</a:t>
             </a:fld>
             <a:endParaRPr lang="en-US"/>
           </a:p>
@@ -2469,7 +2469,7 @@
           <a:p>
             <a:fld id="{04F1D4A2-813C-F741-B481-C92B3A596030}" type="datetimeFigureOut">
               <a:rPr lang="en-US" smtClean="0"/>
-              <a:t>12/27/17</a:t>
+              <a:t>26-Nov-18</a:t>
             </a:fld>
             <a:endParaRPr lang="en-US"/>
           </a:p>
@@ -2722,7 +2722,7 @@
           <a:p>
             <a:fld id="{04F1D4A2-813C-F741-B481-C92B3A596030}" type="datetimeFigureOut">
               <a:rPr lang="en-US" smtClean="0"/>
-              <a:t>12/27/17</a:t>
+              <a:t>26-Nov-18</a:t>
             </a:fld>
             <a:endParaRPr lang="en-US"/>
           </a:p>
@@ -2935,7 +2935,7 @@
           <a:p>
             <a:fld id="{04F1D4A2-813C-F741-B481-C92B3A596030}" type="datetimeFigureOut">
               <a:rPr lang="en-US" smtClean="0"/>
-              <a:t>12/27/17</a:t>
+              <a:t>26-Nov-18</a:t>
             </a:fld>
             <a:endParaRPr lang="en-US"/>
           </a:p>
@@ -3350,9 +3350,16 @@
             <p:ph type="ctrTitle"/>
           </p:nvPr>
         </p:nvSpPr>
-        <p:spPr/>
-        <p:txBody>
-          <a:bodyPr/>
+        <p:spPr>
+          <a:xfrm>
+            <a:off x="396240" y="1122363"/>
+            <a:ext cx="11490960" cy="3283382"/>
+          </a:xfrm>
+        </p:spPr>
+        <p:txBody>
+          <a:bodyPr>
+            <a:normAutofit/>
+          </a:bodyPr>
           <a:lstStyle/>
           <a:p>
             <a:pPr algn="l"/>
@@ -3373,7 +3380,18 @@
             </a:br>
             <a:r>
               <a:rPr lang="en-US" dirty="0" smtClean="0"/>
-              <a:t>Lesson 02: JPA</a:t>
+              <a:t/>
+            </a:r>
+            <a:br>
+              <a:rPr lang="en-US" dirty="0" smtClean="0"/>
+            </a:br>
+            <a:r>
+              <a:rPr lang="en-US" dirty="0" smtClean="0"/>
+              <a:t>Lesson </a:t>
+            </a:r>
+            <a:r>
+              <a:rPr lang="en-US" dirty="0" smtClean="0"/>
+              <a:t>02: JPA</a:t>
             </a:r>
             <a:endParaRPr lang="en-US" dirty="0"/>
           </a:p>
@@ -3391,36 +3409,26 @@
         </p:nvSpPr>
         <p:spPr>
           <a:xfrm>
-            <a:off x="1524000" y="3920358"/>
+            <a:off x="1569720" y="4951136"/>
             <a:ext cx="9144000" cy="1337441"/>
           </a:xfrm>
         </p:spPr>
         <p:txBody>
           <a:bodyPr>
-            <a:normAutofit fontScale="92500" lnSpcReduction="10000"/>
+            <a:normAutofit/>
           </a:bodyPr>
           <a:lstStyle/>
           <a:p>
             <a:pPr algn="r"/>
             <a:r>
               <a:rPr lang="en-US" dirty="0" smtClean="0"/>
-              <a:t>Dr. Andrea Arcuri</a:t>
-            </a:r>
-          </a:p>
-          <a:p>
-            <a:pPr algn="r"/>
+              <a:t>Dr. Andrea </a:t>
+            </a:r>
             <a:r>
               <a:rPr lang="en-US" dirty="0" smtClean="0"/>
-              <a:t>Westerdals Oslo ACT</a:t>
-            </a:r>
-          </a:p>
-          <a:p>
-            <a:pPr algn="r"/>
-            <a:r>
-              <a:rPr lang="en-US" dirty="0" smtClean="0"/>
-              <a:t>University of Luxembourg</a:t>
-            </a:r>
-            <a:endParaRPr lang="en-US" dirty="0"/>
+              <a:t>Arcuri</a:t>
+            </a:r>
+            <a:endParaRPr lang="en-US" dirty="0" smtClean="0"/>
           </a:p>
         </p:txBody>
       </p:sp>
@@ -4549,10 +4557,15 @@
             <p:ph idx="1"/>
           </p:nvPr>
         </p:nvSpPr>
-        <p:spPr/>
+        <p:spPr>
+          <a:xfrm>
+            <a:off x="374073" y="1825624"/>
+            <a:ext cx="11463251" cy="4799619"/>
+          </a:xfrm>
+        </p:spPr>
         <p:txBody>
           <a:bodyPr>
-            <a:normAutofit lnSpcReduction="10000"/>
+            <a:normAutofit/>
           </a:bodyPr>
           <a:lstStyle/>
           <a:p>
@@ -4561,12 +4574,16 @@
               <a:t>You can use </a:t>
             </a:r>
             <a:r>
-              <a:rPr lang="en-US" dirty="0" err="1" smtClean="0"/>
+              <a:rPr lang="en-US" i="1" dirty="0" err="1" smtClean="0"/>
               <a:t>EntityManager#find</a:t>
             </a:r>
             <a:r>
+              <a:rPr lang="en-US" i="1" dirty="0" smtClean="0"/>
+              <a:t>() </a:t>
+            </a:r>
+            <a:r>
               <a:rPr lang="en-US" dirty="0" smtClean="0"/>
-              <a:t>() to query an @Entity with a given id</a:t>
+              <a:t>to query an @Entity with a given id</a:t>
             </a:r>
           </a:p>
           <a:p>
@@ -4590,13 +4607,8 @@
           <a:p>
             <a:r>
               <a:rPr lang="en-US" dirty="0" smtClean="0"/>
-              <a:t>JPA </a:t>
-            </a:r>
-            <a:r>
-              <a:rPr lang="en-US" smtClean="0"/>
-              <a:t>will translate JPQL into SQL at runtime</a:t>
-            </a:r>
-            <a:endParaRPr lang="en-US" dirty="0" smtClean="0"/>
+              <a:t>JPA will translate JPQL into SQL at runtime</a:t>
+            </a:r>
           </a:p>
           <a:p>
             <a:endParaRPr lang="en-US" dirty="0" smtClean="0"/>

</xml_diff>

<commit_message>
new example for SQL tables for data relationships
</commit_message>
<xml_diff>
--- a/doc/intro/slides/lesson_02_jpa.pptx
+++ b/doc/intro/slides/lesson_02_jpa.pptx
@@ -204,7 +204,7 @@
           <a:p>
             <a:fld id="{9B5B52BA-3295-0343-9E28-A260A811DD10}" type="datetimeFigureOut">
               <a:rPr lang="en-US" smtClean="0"/>
-              <a:t>12/26/18</a:t>
+              <a:t>07-Jan-19</a:t>
             </a:fld>
             <a:endParaRPr lang="en-US"/>
           </a:p>
@@ -603,7 +603,7 @@
           <a:p>
             <a:fld id="{04F1D4A2-813C-F741-B481-C92B3A596030}" type="datetimeFigureOut">
               <a:rPr lang="en-US" smtClean="0"/>
-              <a:t>12/26/18</a:t>
+              <a:t>07-Jan-19</a:t>
             </a:fld>
             <a:endParaRPr lang="en-US"/>
           </a:p>
@@ -773,7 +773,7 @@
           <a:p>
             <a:fld id="{04F1D4A2-813C-F741-B481-C92B3A596030}" type="datetimeFigureOut">
               <a:rPr lang="en-US" smtClean="0"/>
-              <a:t>12/26/18</a:t>
+              <a:t>07-Jan-19</a:t>
             </a:fld>
             <a:endParaRPr lang="en-US"/>
           </a:p>
@@ -953,7 +953,7 @@
           <a:p>
             <a:fld id="{04F1D4A2-813C-F741-B481-C92B3A596030}" type="datetimeFigureOut">
               <a:rPr lang="en-US" smtClean="0"/>
-              <a:t>12/26/18</a:t>
+              <a:t>07-Jan-19</a:t>
             </a:fld>
             <a:endParaRPr lang="en-US"/>
           </a:p>
@@ -1134,7 +1134,7 @@
           <a:p>
             <a:fld id="{04F1D4A2-813C-F741-B481-C92B3A596030}" type="datetimeFigureOut">
               <a:rPr lang="en-US" smtClean="0"/>
-              <a:t>12/26/18</a:t>
+              <a:t>07-Jan-19</a:t>
             </a:fld>
             <a:endParaRPr lang="en-US"/>
           </a:p>
@@ -1380,7 +1380,7 @@
           <a:p>
             <a:fld id="{04F1D4A2-813C-F741-B481-C92B3A596030}" type="datetimeFigureOut">
               <a:rPr lang="en-US" smtClean="0"/>
-              <a:t>12/26/18</a:t>
+              <a:t>07-Jan-19</a:t>
             </a:fld>
             <a:endParaRPr lang="en-US"/>
           </a:p>
@@ -1612,7 +1612,7 @@
           <a:p>
             <a:fld id="{04F1D4A2-813C-F741-B481-C92B3A596030}" type="datetimeFigureOut">
               <a:rPr lang="en-US" smtClean="0"/>
-              <a:t>12/26/18</a:t>
+              <a:t>07-Jan-19</a:t>
             </a:fld>
             <a:endParaRPr lang="en-US"/>
           </a:p>
@@ -1979,7 +1979,7 @@
           <a:p>
             <a:fld id="{04F1D4A2-813C-F741-B481-C92B3A596030}" type="datetimeFigureOut">
               <a:rPr lang="en-US" smtClean="0"/>
-              <a:t>12/26/18</a:t>
+              <a:t>07-Jan-19</a:t>
             </a:fld>
             <a:endParaRPr lang="en-US"/>
           </a:p>
@@ -2097,7 +2097,7 @@
           <a:p>
             <a:fld id="{04F1D4A2-813C-F741-B481-C92B3A596030}" type="datetimeFigureOut">
               <a:rPr lang="en-US" smtClean="0"/>
-              <a:t>12/26/18</a:t>
+              <a:t>07-Jan-19</a:t>
             </a:fld>
             <a:endParaRPr lang="en-US"/>
           </a:p>
@@ -2192,7 +2192,7 @@
           <a:p>
             <a:fld id="{04F1D4A2-813C-F741-B481-C92B3A596030}" type="datetimeFigureOut">
               <a:rPr lang="en-US" smtClean="0"/>
-              <a:t>12/26/18</a:t>
+              <a:t>07-Jan-19</a:t>
             </a:fld>
             <a:endParaRPr lang="en-US"/>
           </a:p>
@@ -2469,7 +2469,7 @@
           <a:p>
             <a:fld id="{04F1D4A2-813C-F741-B481-C92B3A596030}" type="datetimeFigureOut">
               <a:rPr lang="en-US" smtClean="0"/>
-              <a:t>12/26/18</a:t>
+              <a:t>07-Jan-19</a:t>
             </a:fld>
             <a:endParaRPr lang="en-US"/>
           </a:p>
@@ -2722,7 +2722,7 @@
           <a:p>
             <a:fld id="{04F1D4A2-813C-F741-B481-C92B3A596030}" type="datetimeFigureOut">
               <a:rPr lang="en-US" smtClean="0"/>
-              <a:t>12/26/18</a:t>
+              <a:t>07-Jan-19</a:t>
             </a:fld>
             <a:endParaRPr lang="en-US"/>
           </a:p>
@@ -2935,7 +2935,7 @@
           <a:p>
             <a:fld id="{04F1D4A2-813C-F741-B481-C92B3A596030}" type="datetimeFigureOut">
               <a:rPr lang="en-US" smtClean="0"/>
-              <a:t>12/26/18</a:t>
+              <a:t>07-Jan-19</a:t>
             </a:fld>
             <a:endParaRPr lang="en-US"/>
           </a:p>
@@ -3418,11 +3418,7 @@
             <a:pPr algn="r"/>
             <a:r>
               <a:rPr lang="en-US" smtClean="0"/>
-              <a:t>Prof</a:t>
-            </a:r>
-            <a:r>
-              <a:rPr lang="en-US" smtClean="0"/>
-              <a:t>. </a:t>
+              <a:t>Prof. </a:t>
             </a:r>
             <a:r>
               <a:rPr lang="en-US" dirty="0" smtClean="0"/>
@@ -4991,6 +4987,33 @@
               <a:rPr lang="en-US" b="1" dirty="0" smtClean="0"/>
               <a:t>/relationship</a:t>
             </a:r>
+          </a:p>
+          <a:p>
+            <a:r>
+              <a:rPr lang="en-US" b="1" dirty="0" smtClean="0"/>
+              <a:t>intro/</a:t>
+            </a:r>
+            <a:r>
+              <a:rPr lang="en-US" b="1" dirty="0" err="1" smtClean="0"/>
+              <a:t>jee</a:t>
+            </a:r>
+            <a:r>
+              <a:rPr lang="en-US" b="1" dirty="0" smtClean="0"/>
+              <a:t>/</a:t>
+            </a:r>
+            <a:r>
+              <a:rPr lang="en-US" b="1" dirty="0" err="1" smtClean="0"/>
+              <a:t>jpa</a:t>
+            </a:r>
+            <a:r>
+              <a:rPr lang="en-US" b="1" dirty="0" smtClean="0"/>
+              <a:t>/relationship-</a:t>
+            </a:r>
+            <a:r>
+              <a:rPr lang="en-US" b="1" smtClean="0"/>
+              <a:t>sql</a:t>
+            </a:r>
+            <a:endParaRPr lang="en-US" b="1" smtClean="0"/>
           </a:p>
           <a:p>
             <a:r>

</xml_diff>

<commit_message>
fixed wrong description of 1-to-Many
</commit_message>
<xml_diff>
--- a/doc/intro/slides/lesson_02_jpa.pptx
+++ b/doc/intro/slides/lesson_02_jpa.pptx
@@ -5,7 +5,7 @@
     <p:sldMasterId id="2147483648" r:id="rId1"/>
   </p:sldMasterIdLst>
   <p:notesMasterIdLst>
-    <p:notesMasterId r:id="rId14"/>
+    <p:notesMasterId r:id="rId15"/>
   </p:notesMasterIdLst>
   <p:sldIdLst>
     <p:sldId id="256" r:id="rId2"/>
@@ -13,13 +13,14 @@
     <p:sldId id="257" r:id="rId4"/>
     <p:sldId id="277" r:id="rId5"/>
     <p:sldId id="279" r:id="rId6"/>
-    <p:sldId id="281" r:id="rId7"/>
-    <p:sldId id="280" r:id="rId8"/>
-    <p:sldId id="272" r:id="rId9"/>
-    <p:sldId id="273" r:id="rId10"/>
-    <p:sldId id="282" r:id="rId11"/>
-    <p:sldId id="278" r:id="rId12"/>
-    <p:sldId id="271" r:id="rId13"/>
+    <p:sldId id="280" r:id="rId7"/>
+    <p:sldId id="283" r:id="rId8"/>
+    <p:sldId id="281" r:id="rId9"/>
+    <p:sldId id="272" r:id="rId10"/>
+    <p:sldId id="273" r:id="rId11"/>
+    <p:sldId id="282" r:id="rId12"/>
+    <p:sldId id="278" r:id="rId13"/>
+    <p:sldId id="271" r:id="rId14"/>
   </p:sldIdLst>
   <p:sldSz cx="12192000" cy="6858000"/>
   <p:notesSz cx="6858000" cy="9144000"/>
@@ -208,7 +209,7 @@
           <a:p>
             <a:fld id="{9B5B52BA-3295-0343-9E28-A260A811DD10}" type="datetimeFigureOut">
               <a:rPr lang="en-US" smtClean="0"/>
-              <a:t>18-Dec-19</a:t>
+              <a:t>19-Dec-19</a:t>
             </a:fld>
             <a:endParaRPr lang="en-US"/>
           </a:p>
@@ -607,7 +608,7 @@
           <a:p>
             <a:fld id="{04F1D4A2-813C-F741-B481-C92B3A596030}" type="datetimeFigureOut">
               <a:rPr lang="en-US" smtClean="0"/>
-              <a:t>18-Dec-19</a:t>
+              <a:t>19-Dec-19</a:t>
             </a:fld>
             <a:endParaRPr lang="en-US"/>
           </a:p>
@@ -777,7 +778,7 @@
           <a:p>
             <a:fld id="{04F1D4A2-813C-F741-B481-C92B3A596030}" type="datetimeFigureOut">
               <a:rPr lang="en-US" smtClean="0"/>
-              <a:t>18-Dec-19</a:t>
+              <a:t>19-Dec-19</a:t>
             </a:fld>
             <a:endParaRPr lang="en-US"/>
           </a:p>
@@ -957,7 +958,7 @@
           <a:p>
             <a:fld id="{04F1D4A2-813C-F741-B481-C92B3A596030}" type="datetimeFigureOut">
               <a:rPr lang="en-US" smtClean="0"/>
-              <a:t>18-Dec-19</a:t>
+              <a:t>19-Dec-19</a:t>
             </a:fld>
             <a:endParaRPr lang="en-US"/>
           </a:p>
@@ -1138,7 +1139,7 @@
           <a:p>
             <a:fld id="{04F1D4A2-813C-F741-B481-C92B3A596030}" type="datetimeFigureOut">
               <a:rPr lang="en-US" smtClean="0"/>
-              <a:t>18-Dec-19</a:t>
+              <a:t>19-Dec-19</a:t>
             </a:fld>
             <a:endParaRPr lang="en-US"/>
           </a:p>
@@ -1384,7 +1385,7 @@
           <a:p>
             <a:fld id="{04F1D4A2-813C-F741-B481-C92B3A596030}" type="datetimeFigureOut">
               <a:rPr lang="en-US" smtClean="0"/>
-              <a:t>18-Dec-19</a:t>
+              <a:t>19-Dec-19</a:t>
             </a:fld>
             <a:endParaRPr lang="en-US"/>
           </a:p>
@@ -1616,7 +1617,7 @@
           <a:p>
             <a:fld id="{04F1D4A2-813C-F741-B481-C92B3A596030}" type="datetimeFigureOut">
               <a:rPr lang="en-US" smtClean="0"/>
-              <a:t>18-Dec-19</a:t>
+              <a:t>19-Dec-19</a:t>
             </a:fld>
             <a:endParaRPr lang="en-US"/>
           </a:p>
@@ -1983,7 +1984,7 @@
           <a:p>
             <a:fld id="{04F1D4A2-813C-F741-B481-C92B3A596030}" type="datetimeFigureOut">
               <a:rPr lang="en-US" smtClean="0"/>
-              <a:t>18-Dec-19</a:t>
+              <a:t>19-Dec-19</a:t>
             </a:fld>
             <a:endParaRPr lang="en-US"/>
           </a:p>
@@ -2101,7 +2102,7 @@
           <a:p>
             <a:fld id="{04F1D4A2-813C-F741-B481-C92B3A596030}" type="datetimeFigureOut">
               <a:rPr lang="en-US" smtClean="0"/>
-              <a:t>18-Dec-19</a:t>
+              <a:t>19-Dec-19</a:t>
             </a:fld>
             <a:endParaRPr lang="en-US"/>
           </a:p>
@@ -2196,7 +2197,7 @@
           <a:p>
             <a:fld id="{04F1D4A2-813C-F741-B481-C92B3A596030}" type="datetimeFigureOut">
               <a:rPr lang="en-US" smtClean="0"/>
-              <a:t>18-Dec-19</a:t>
+              <a:t>19-Dec-19</a:t>
             </a:fld>
             <a:endParaRPr lang="en-US"/>
           </a:p>
@@ -2473,7 +2474,7 @@
           <a:p>
             <a:fld id="{04F1D4A2-813C-F741-B481-C92B3A596030}" type="datetimeFigureOut">
               <a:rPr lang="en-US" smtClean="0"/>
-              <a:t>18-Dec-19</a:t>
+              <a:t>19-Dec-19</a:t>
             </a:fld>
             <a:endParaRPr lang="en-US"/>
           </a:p>
@@ -2726,7 +2727,7 @@
           <a:p>
             <a:fld id="{04F1D4A2-813C-F741-B481-C92B3A596030}" type="datetimeFigureOut">
               <a:rPr lang="en-US" smtClean="0"/>
-              <a:t>18-Dec-19</a:t>
+              <a:t>19-Dec-19</a:t>
             </a:fld>
             <a:endParaRPr lang="en-US"/>
           </a:p>
@@ -2939,7 +2940,7 @@
           <a:p>
             <a:fld id="{04F1D4A2-813C-F741-B481-C92B3A596030}" type="datetimeFigureOut">
               <a:rPr lang="en-US" smtClean="0"/>
-              <a:t>18-Dec-19</a:t>
+              <a:t>19-Dec-19</a:t>
             </a:fld>
             <a:endParaRPr lang="en-US"/>
           </a:p>
@@ -3471,6 +3472,176 @@
             <p:ph type="title"/>
           </p:nvPr>
         </p:nvSpPr>
+        <p:spPr>
+          <a:xfrm>
+            <a:off x="293077" y="365125"/>
+            <a:ext cx="11687908" cy="1325563"/>
+          </a:xfrm>
+        </p:spPr>
+        <p:txBody>
+          <a:bodyPr>
+            <a:noAutofit/>
+          </a:bodyPr>
+          <a:lstStyle/>
+          <a:p>
+            <a:r>
+              <a:rPr lang="en-US" sz="5400" b="1" dirty="0"/>
+              <a:t>Java Persistence </a:t>
+            </a:r>
+            <a:r>
+              <a:rPr lang="en-US" sz="5400" b="1" dirty="0" smtClean="0"/>
+              <a:t>query language</a:t>
+            </a:r>
+            <a:r>
+              <a:rPr lang="en-US" sz="5400" dirty="0"/>
+              <a:t> </a:t>
+            </a:r>
+            <a:r>
+              <a:rPr lang="en-US" sz="5400" dirty="0" smtClean="0"/>
+              <a:t>(</a:t>
+            </a:r>
+            <a:r>
+              <a:rPr lang="en-US" sz="5400" b="1" dirty="0"/>
+              <a:t>JPQL</a:t>
+            </a:r>
+            <a:r>
+              <a:rPr lang="en-US" sz="5400" dirty="0"/>
+              <a:t>) </a:t>
+            </a:r>
+          </a:p>
+        </p:txBody>
+      </p:sp>
+      <p:sp>
+        <p:nvSpPr>
+          <p:cNvPr id="3" name="Content Placeholder 2"/>
+          <p:cNvSpPr>
+            <a:spLocks noGrp="1"/>
+          </p:cNvSpPr>
+          <p:nvPr>
+            <p:ph idx="1"/>
+          </p:nvPr>
+        </p:nvSpPr>
+        <p:spPr>
+          <a:xfrm>
+            <a:off x="374073" y="1825624"/>
+            <a:ext cx="11463251" cy="4799619"/>
+          </a:xfrm>
+        </p:spPr>
+        <p:txBody>
+          <a:bodyPr>
+            <a:normAutofit/>
+          </a:bodyPr>
+          <a:lstStyle/>
+          <a:p>
+            <a:r>
+              <a:rPr lang="en-US" dirty="0" smtClean="0"/>
+              <a:t>You can use </a:t>
+            </a:r>
+            <a:r>
+              <a:rPr lang="en-US" i="1" dirty="0" err="1" smtClean="0"/>
+              <a:t>EntityManager#find</a:t>
+            </a:r>
+            <a:r>
+              <a:rPr lang="en-US" i="1" dirty="0" smtClean="0"/>
+              <a:t>(id) </a:t>
+            </a:r>
+            <a:r>
+              <a:rPr lang="en-US" dirty="0" smtClean="0"/>
+              <a:t>to query an </a:t>
+            </a:r>
+            <a:r>
+              <a:rPr lang="en-US" i="1" dirty="0" smtClean="0"/>
+              <a:t>@Entity</a:t>
+            </a:r>
+            <a:r>
+              <a:rPr lang="en-US" dirty="0" smtClean="0"/>
+              <a:t> with a given </a:t>
+            </a:r>
+            <a:r>
+              <a:rPr lang="en-US" i="1" dirty="0" smtClean="0"/>
+              <a:t>id</a:t>
+            </a:r>
+          </a:p>
+          <a:p>
+            <a:r>
+              <a:rPr lang="en-US" dirty="0" smtClean="0"/>
+              <a:t>But what if you need to find all quizzes in a given category?</a:t>
+            </a:r>
+          </a:p>
+          <a:p>
+            <a:r>
+              <a:rPr lang="en-US" dirty="0" smtClean="0"/>
+              <a:t>You can of course use SQL</a:t>
+            </a:r>
+          </a:p>
+          <a:p>
+            <a:r>
+              <a:rPr lang="en-US" dirty="0" smtClean="0"/>
+              <a:t>JPQL: similar to SQL in syntax, but works by referring directly to </a:t>
+            </a:r>
+            <a:r>
+              <a:rPr lang="en-US" i="1" dirty="0" smtClean="0"/>
+              <a:t>@Entity</a:t>
+            </a:r>
+            <a:r>
+              <a:rPr lang="en-US" dirty="0" smtClean="0"/>
+              <a:t>, and not tables in DB </a:t>
+            </a:r>
+          </a:p>
+          <a:p>
+            <a:r>
+              <a:rPr lang="en-US" dirty="0" smtClean="0"/>
+              <a:t>JPA will translate JPQL into SQL at runtime</a:t>
+            </a:r>
+          </a:p>
+          <a:p>
+            <a:endParaRPr lang="en-US" dirty="0" smtClean="0"/>
+          </a:p>
+          <a:p>
+            <a:endParaRPr lang="en-US" dirty="0"/>
+          </a:p>
+        </p:txBody>
+      </p:sp>
+    </p:spTree>
+    <p:extLst>
+      <p:ext uri="{BB962C8B-B14F-4D97-AF65-F5344CB8AC3E}">
+        <p14:creationId xmlns:p14="http://schemas.microsoft.com/office/powerpoint/2010/main" val="1194937673"/>
+      </p:ext>
+    </p:extLst>
+  </p:cSld>
+  <p:clrMapOvr>
+    <a:masterClrMapping/>
+  </p:clrMapOvr>
+</p:sld>
+</file>
+
+<file path=ppt/slides/slide11.xml><?xml version="1.0" encoding="utf-8"?>
+<p:sld xmlns:a="http://schemas.openxmlformats.org/drawingml/2006/main" xmlns:r="http://schemas.openxmlformats.org/officeDocument/2006/relationships" xmlns:p="http://schemas.openxmlformats.org/presentationml/2006/main">
+  <p:cSld>
+    <p:spTree>
+      <p:nvGrpSpPr>
+        <p:cNvPr id="1" name=""/>
+        <p:cNvGrpSpPr/>
+        <p:nvPr/>
+      </p:nvGrpSpPr>
+      <p:grpSpPr>
+        <a:xfrm>
+          <a:off x="0" y="0"/>
+          <a:ext cx="0" cy="0"/>
+          <a:chOff x="0" y="0"/>
+          <a:chExt cx="0" cy="0"/>
+        </a:xfrm>
+      </p:grpSpPr>
+      <p:sp>
+        <p:nvSpPr>
+          <p:cNvPr id="2" name="Title 1"/>
+          <p:cNvSpPr>
+            <a:spLocks noGrp="1"/>
+          </p:cNvSpPr>
+          <p:nvPr>
+            <p:ph type="title"/>
+          </p:nvPr>
+        </p:nvSpPr>
         <p:spPr/>
         <p:txBody>
           <a:bodyPr/>
@@ -3806,7 +3977,7 @@
 </p:sld>
 </file>
 
-<file path=ppt/slides/slide11.xml><?xml version="1.0" encoding="utf-8"?>
+<file path=ppt/slides/slide12.xml><?xml version="1.0" encoding="utf-8"?>
 <p:sld xmlns:a="http://schemas.openxmlformats.org/drawingml/2006/main" xmlns:r="http://schemas.openxmlformats.org/officeDocument/2006/relationships" xmlns:p="http://schemas.openxmlformats.org/presentationml/2006/main">
   <p:cSld>
     <p:spTree>
@@ -4075,7 +4246,7 @@
 </p:sld>
 </file>
 
-<file path=ppt/slides/slide12.xml><?xml version="1.0" encoding="utf-8"?>
+<file path=ppt/slides/slide13.xml><?xml version="1.0" encoding="utf-8"?>
 <p:sld xmlns:a="http://schemas.openxmlformats.org/drawingml/2006/main" xmlns:r="http://schemas.openxmlformats.org/officeDocument/2006/relationships" xmlns:p="http://schemas.openxmlformats.org/presentationml/2006/main">
   <p:cSld>
     <p:spTree>
@@ -5399,6 +5570,1673 @@
         </p:nvSpPr>
         <p:spPr>
           <a:xfrm>
+            <a:off x="838200" y="82256"/>
+            <a:ext cx="10515600" cy="1075546"/>
+          </a:xfrm>
+        </p:spPr>
+        <p:txBody>
+          <a:bodyPr/>
+          <a:lstStyle/>
+          <a:p>
+            <a:r>
+              <a:rPr lang="en-US" dirty="0" smtClean="0"/>
+              <a:t>Many-to-Many</a:t>
+            </a:r>
+            <a:endParaRPr lang="en-US" dirty="0"/>
+          </a:p>
+        </p:txBody>
+      </p:sp>
+      <p:sp>
+        <p:nvSpPr>
+          <p:cNvPr id="3" name="Content Placeholder 2"/>
+          <p:cNvSpPr>
+            <a:spLocks noGrp="1"/>
+          </p:cNvSpPr>
+          <p:nvPr>
+            <p:ph idx="1"/>
+          </p:nvPr>
+        </p:nvSpPr>
+        <p:spPr>
+          <a:xfrm>
+            <a:off x="229937" y="1220409"/>
+            <a:ext cx="11774905" cy="2152439"/>
+          </a:xfrm>
+        </p:spPr>
+        <p:txBody>
+          <a:bodyPr>
+            <a:normAutofit lnSpcReduction="10000"/>
+          </a:bodyPr>
+          <a:lstStyle/>
+          <a:p>
+            <a:r>
+              <a:rPr lang="en-US" dirty="0" smtClean="0"/>
+              <a:t>If an </a:t>
+            </a:r>
+            <a:r>
+              <a:rPr lang="en-US" i="1" dirty="0" smtClean="0"/>
+              <a:t>X</a:t>
+            </a:r>
+            <a:r>
+              <a:rPr lang="en-US" dirty="0" smtClean="0"/>
+              <a:t> element has links to many </a:t>
+            </a:r>
+            <a:r>
+              <a:rPr lang="en-US" i="1" dirty="0" smtClean="0"/>
+              <a:t>Y</a:t>
+            </a:r>
+            <a:r>
+              <a:rPr lang="en-US" dirty="0" smtClean="0"/>
+              <a:t>s, and a </a:t>
+            </a:r>
+            <a:r>
+              <a:rPr lang="en-US" i="1" dirty="0" smtClean="0"/>
+              <a:t>Y</a:t>
+            </a:r>
+            <a:r>
+              <a:rPr lang="en-US" dirty="0" smtClean="0"/>
+              <a:t> can have links to many </a:t>
+            </a:r>
+            <a:r>
+              <a:rPr lang="en-US" i="1" dirty="0" err="1" smtClean="0"/>
+              <a:t>X</a:t>
+            </a:r>
+            <a:r>
+              <a:rPr lang="en-US" dirty="0" err="1" smtClean="0"/>
+              <a:t>s</a:t>
+            </a:r>
+            <a:r>
+              <a:rPr lang="en-US" dirty="0" smtClean="0"/>
+              <a:t>, we need a third table with 2 FKs</a:t>
+            </a:r>
+          </a:p>
+          <a:p>
+            <a:r>
+              <a:rPr lang="en-US" dirty="0" err="1" smtClean="0"/>
+              <a:t>Eg</a:t>
+            </a:r>
+            <a:r>
+              <a:rPr lang="en-US" dirty="0" smtClean="0"/>
+              <a:t>, </a:t>
+            </a:r>
+            <a:r>
+              <a:rPr lang="en-US" i="1" dirty="0" smtClean="0"/>
+              <a:t>0</a:t>
+            </a:r>
+            <a:r>
+              <a:rPr lang="en-US" dirty="0" smtClean="0"/>
+              <a:t> has link to </a:t>
+            </a:r>
+            <a:r>
+              <a:rPr lang="en-US" i="1" dirty="0" smtClean="0"/>
+              <a:t>b </a:t>
+            </a:r>
+            <a:r>
+              <a:rPr lang="en-US" dirty="0" smtClean="0"/>
+              <a:t>and </a:t>
+            </a:r>
+            <a:r>
+              <a:rPr lang="en-US" i="1" dirty="0" smtClean="0"/>
+              <a:t>e</a:t>
+            </a:r>
+            <a:r>
+              <a:rPr lang="en-US" dirty="0" smtClean="0"/>
+              <a:t>, where </a:t>
+            </a:r>
+            <a:r>
+              <a:rPr lang="en-US" i="1" dirty="0" smtClean="0"/>
+              <a:t>e</a:t>
+            </a:r>
+            <a:r>
+              <a:rPr lang="en-US" dirty="0" smtClean="0"/>
+              <a:t> also has link to </a:t>
+            </a:r>
+            <a:r>
+              <a:rPr lang="en-US" i="1" dirty="0" smtClean="0"/>
+              <a:t>1</a:t>
+            </a:r>
+          </a:p>
+          <a:p>
+            <a:r>
+              <a:rPr lang="en-US" dirty="0" smtClean="0"/>
+              <a:t>Unidirectional and bidirectional use same SQL tables</a:t>
+            </a:r>
+            <a:endParaRPr lang="en-US" dirty="0"/>
+          </a:p>
+        </p:txBody>
+      </p:sp>
+      <p:graphicFrame>
+        <p:nvGraphicFramePr>
+          <p:cNvPr id="4" name="Table 3"/>
+          <p:cNvGraphicFramePr>
+            <a:graphicFrameLocks noGrp="1"/>
+          </p:cNvGraphicFramePr>
+          <p:nvPr>
+            <p:extLst>
+              <p:ext uri="{D42A27DB-BD31-4B8C-83A1-F6EECF244321}">
+                <p14:modId xmlns:p14="http://schemas.microsoft.com/office/powerpoint/2010/main" val="2494123472"/>
+              </p:ext>
+            </p:extLst>
+          </p:nvPr>
+        </p:nvGraphicFramePr>
+        <p:xfrm>
+          <a:off x="889970" y="3846494"/>
+          <a:ext cx="1219199" cy="1371600"/>
+        </p:xfrm>
+        <a:graphic>
+          <a:graphicData uri="http://schemas.openxmlformats.org/drawingml/2006/table">
+            <a:tbl>
+              <a:tblPr firstRow="1" bandRow="1">
+                <a:tableStyleId>{5C22544A-7EE6-4342-B048-85BDC9FD1C3A}</a:tableStyleId>
+              </a:tblPr>
+              <a:tblGrid>
+                <a:gridCol w="1219199">
+                  <a:extLst>
+                    <a:ext uri="{9D8B030D-6E8A-4147-A177-3AD203B41FA5}">
+                      <a16:colId xmlns:a16="http://schemas.microsoft.com/office/drawing/2014/main" val="1636146242"/>
+                    </a:ext>
+                  </a:extLst>
+                </a:gridCol>
+              </a:tblGrid>
+              <a:tr h="370840">
+                <a:tc>
+                  <a:txBody>
+                    <a:bodyPr/>
+                    <a:lstStyle/>
+                    <a:p>
+                      <a:pPr algn="ctr"/>
+                      <a:r>
+                        <a:rPr lang="en-US" sz="2400" dirty="0" smtClean="0"/>
+                        <a:t>X-PK</a:t>
+                      </a:r>
+                      <a:endParaRPr lang="en-US" sz="2400" dirty="0"/>
+                    </a:p>
+                  </a:txBody>
+                  <a:tcPr/>
+                </a:tc>
+                <a:extLst>
+                  <a:ext uri="{0D108BD9-81ED-4DB2-BD59-A6C34878D82A}">
+                    <a16:rowId xmlns:a16="http://schemas.microsoft.com/office/drawing/2014/main" val="3010766445"/>
+                  </a:ext>
+                </a:extLst>
+              </a:tr>
+              <a:tr h="370840">
+                <a:tc>
+                  <a:txBody>
+                    <a:bodyPr/>
+                    <a:lstStyle/>
+                    <a:p>
+                      <a:pPr algn="ctr"/>
+                      <a:r>
+                        <a:rPr lang="en-US" sz="2400" dirty="0" smtClean="0"/>
+                        <a:t>0</a:t>
+                      </a:r>
+                      <a:endParaRPr lang="en-US" sz="2400" dirty="0"/>
+                    </a:p>
+                  </a:txBody>
+                  <a:tcPr/>
+                </a:tc>
+                <a:extLst>
+                  <a:ext uri="{0D108BD9-81ED-4DB2-BD59-A6C34878D82A}">
+                    <a16:rowId xmlns:a16="http://schemas.microsoft.com/office/drawing/2014/main" val="4239011705"/>
+                  </a:ext>
+                </a:extLst>
+              </a:tr>
+              <a:tr h="370840">
+                <a:tc>
+                  <a:txBody>
+                    <a:bodyPr/>
+                    <a:lstStyle/>
+                    <a:p>
+                      <a:pPr algn="ctr"/>
+                      <a:r>
+                        <a:rPr lang="en-US" sz="2400" dirty="0" smtClean="0"/>
+                        <a:t>1</a:t>
+                      </a:r>
+                      <a:endParaRPr lang="en-US" sz="2400" dirty="0"/>
+                    </a:p>
+                  </a:txBody>
+                  <a:tcPr/>
+                </a:tc>
+                <a:extLst>
+                  <a:ext uri="{0D108BD9-81ED-4DB2-BD59-A6C34878D82A}">
+                    <a16:rowId xmlns:a16="http://schemas.microsoft.com/office/drawing/2014/main" val="3324439667"/>
+                  </a:ext>
+                </a:extLst>
+              </a:tr>
+            </a:tbl>
+          </a:graphicData>
+        </a:graphic>
+      </p:graphicFrame>
+      <p:graphicFrame>
+        <p:nvGraphicFramePr>
+          <p:cNvPr id="5" name="Table 4"/>
+          <p:cNvGraphicFramePr>
+            <a:graphicFrameLocks noGrp="1"/>
+          </p:cNvGraphicFramePr>
+          <p:nvPr>
+            <p:extLst>
+              <p:ext uri="{D42A27DB-BD31-4B8C-83A1-F6EECF244321}">
+                <p14:modId xmlns:p14="http://schemas.microsoft.com/office/powerpoint/2010/main" val="3748651641"/>
+              </p:ext>
+            </p:extLst>
+          </p:nvPr>
+        </p:nvGraphicFramePr>
+        <p:xfrm>
+          <a:off x="9593370" y="3846494"/>
+          <a:ext cx="1668379" cy="2743200"/>
+        </p:xfrm>
+        <a:graphic>
+          <a:graphicData uri="http://schemas.openxmlformats.org/drawingml/2006/table">
+            <a:tbl>
+              <a:tblPr firstRow="1" bandRow="1">
+                <a:tableStyleId>{00A15C55-8517-42AA-B614-E9B94910E393}</a:tableStyleId>
+              </a:tblPr>
+              <a:tblGrid>
+                <a:gridCol w="1668379">
+                  <a:extLst>
+                    <a:ext uri="{9D8B030D-6E8A-4147-A177-3AD203B41FA5}">
+                      <a16:colId xmlns:a16="http://schemas.microsoft.com/office/drawing/2014/main" val="3161174791"/>
+                    </a:ext>
+                  </a:extLst>
+                </a:gridCol>
+              </a:tblGrid>
+              <a:tr h="370840">
+                <a:tc>
+                  <a:txBody>
+                    <a:bodyPr/>
+                    <a:lstStyle/>
+                    <a:p>
+                      <a:pPr algn="ctr"/>
+                      <a:r>
+                        <a:rPr lang="en-US" sz="2400" dirty="0" smtClean="0"/>
+                        <a:t>Y-PK</a:t>
+                      </a:r>
+                      <a:endParaRPr lang="en-US" sz="2400" dirty="0"/>
+                    </a:p>
+                  </a:txBody>
+                  <a:tcPr/>
+                </a:tc>
+                <a:extLst>
+                  <a:ext uri="{0D108BD9-81ED-4DB2-BD59-A6C34878D82A}">
+                    <a16:rowId xmlns:a16="http://schemas.microsoft.com/office/drawing/2014/main" val="1018849219"/>
+                  </a:ext>
+                </a:extLst>
+              </a:tr>
+              <a:tr h="370840">
+                <a:tc>
+                  <a:txBody>
+                    <a:bodyPr/>
+                    <a:lstStyle/>
+                    <a:p>
+                      <a:pPr algn="ctr"/>
+                      <a:r>
+                        <a:rPr lang="en-US" sz="2400" dirty="0" smtClean="0"/>
+                        <a:t>a</a:t>
+                      </a:r>
+                      <a:endParaRPr lang="en-US" sz="2400" dirty="0"/>
+                    </a:p>
+                  </a:txBody>
+                  <a:tcPr/>
+                </a:tc>
+                <a:extLst>
+                  <a:ext uri="{0D108BD9-81ED-4DB2-BD59-A6C34878D82A}">
+                    <a16:rowId xmlns:a16="http://schemas.microsoft.com/office/drawing/2014/main" val="2415621694"/>
+                  </a:ext>
+                </a:extLst>
+              </a:tr>
+              <a:tr h="370840">
+                <a:tc>
+                  <a:txBody>
+                    <a:bodyPr/>
+                    <a:lstStyle/>
+                    <a:p>
+                      <a:pPr algn="ctr"/>
+                      <a:r>
+                        <a:rPr lang="en-US" sz="2400" dirty="0" smtClean="0"/>
+                        <a:t>b</a:t>
+                      </a:r>
+                      <a:endParaRPr lang="en-US" sz="2400" dirty="0"/>
+                    </a:p>
+                  </a:txBody>
+                  <a:tcPr/>
+                </a:tc>
+                <a:extLst>
+                  <a:ext uri="{0D108BD9-81ED-4DB2-BD59-A6C34878D82A}">
+                    <a16:rowId xmlns:a16="http://schemas.microsoft.com/office/drawing/2014/main" val="3368192205"/>
+                  </a:ext>
+                </a:extLst>
+              </a:tr>
+              <a:tr h="370840">
+                <a:tc>
+                  <a:txBody>
+                    <a:bodyPr/>
+                    <a:lstStyle/>
+                    <a:p>
+                      <a:pPr algn="ctr"/>
+                      <a:r>
+                        <a:rPr lang="en-US" sz="2400" dirty="0" smtClean="0"/>
+                        <a:t>c</a:t>
+                      </a:r>
+                      <a:endParaRPr lang="en-US" sz="2400" dirty="0"/>
+                    </a:p>
+                  </a:txBody>
+                  <a:tcPr/>
+                </a:tc>
+                <a:extLst>
+                  <a:ext uri="{0D108BD9-81ED-4DB2-BD59-A6C34878D82A}">
+                    <a16:rowId xmlns:a16="http://schemas.microsoft.com/office/drawing/2014/main" val="1690100288"/>
+                  </a:ext>
+                </a:extLst>
+              </a:tr>
+              <a:tr h="370840">
+                <a:tc>
+                  <a:txBody>
+                    <a:bodyPr/>
+                    <a:lstStyle/>
+                    <a:p>
+                      <a:pPr algn="ctr"/>
+                      <a:r>
+                        <a:rPr lang="en-US" sz="2400" dirty="0" smtClean="0"/>
+                        <a:t>d</a:t>
+                      </a:r>
+                      <a:endParaRPr lang="en-US" sz="2400" dirty="0"/>
+                    </a:p>
+                  </a:txBody>
+                  <a:tcPr/>
+                </a:tc>
+                <a:extLst>
+                  <a:ext uri="{0D108BD9-81ED-4DB2-BD59-A6C34878D82A}">
+                    <a16:rowId xmlns:a16="http://schemas.microsoft.com/office/drawing/2014/main" val="1833299649"/>
+                  </a:ext>
+                </a:extLst>
+              </a:tr>
+              <a:tr h="370840">
+                <a:tc>
+                  <a:txBody>
+                    <a:bodyPr/>
+                    <a:lstStyle/>
+                    <a:p>
+                      <a:pPr algn="ctr"/>
+                      <a:r>
+                        <a:rPr lang="en-US" sz="2400" dirty="0" smtClean="0"/>
+                        <a:t>e</a:t>
+                      </a:r>
+                      <a:endParaRPr lang="en-US" sz="2400" dirty="0"/>
+                    </a:p>
+                  </a:txBody>
+                  <a:tcPr/>
+                </a:tc>
+                <a:extLst>
+                  <a:ext uri="{0D108BD9-81ED-4DB2-BD59-A6C34878D82A}">
+                    <a16:rowId xmlns:a16="http://schemas.microsoft.com/office/drawing/2014/main" val="928400680"/>
+                  </a:ext>
+                </a:extLst>
+              </a:tr>
+            </a:tbl>
+          </a:graphicData>
+        </a:graphic>
+      </p:graphicFrame>
+      <p:graphicFrame>
+        <p:nvGraphicFramePr>
+          <p:cNvPr id="6" name="Table 5"/>
+          <p:cNvGraphicFramePr>
+            <a:graphicFrameLocks noGrp="1"/>
+          </p:cNvGraphicFramePr>
+          <p:nvPr>
+            <p:extLst>
+              <p:ext uri="{D42A27DB-BD31-4B8C-83A1-F6EECF244321}">
+                <p14:modId xmlns:p14="http://schemas.microsoft.com/office/powerpoint/2010/main" val="275498510"/>
+              </p:ext>
+            </p:extLst>
+          </p:nvPr>
+        </p:nvGraphicFramePr>
+        <p:xfrm>
+          <a:off x="4177294" y="3846494"/>
+          <a:ext cx="3028996" cy="1828800"/>
+        </p:xfrm>
+        <a:graphic>
+          <a:graphicData uri="http://schemas.openxmlformats.org/drawingml/2006/table">
+            <a:tbl>
+              <a:tblPr firstRow="1" bandRow="1">
+                <a:tableStyleId>{073A0DAA-6AF3-43AB-8588-CEC1D06C72B9}</a:tableStyleId>
+              </a:tblPr>
+              <a:tblGrid>
+                <a:gridCol w="1514498">
+                  <a:extLst>
+                    <a:ext uri="{9D8B030D-6E8A-4147-A177-3AD203B41FA5}">
+                      <a16:colId xmlns:a16="http://schemas.microsoft.com/office/drawing/2014/main" val="3894862203"/>
+                    </a:ext>
+                  </a:extLst>
+                </a:gridCol>
+                <a:gridCol w="1514498">
+                  <a:extLst>
+                    <a:ext uri="{9D8B030D-6E8A-4147-A177-3AD203B41FA5}">
+                      <a16:colId xmlns:a16="http://schemas.microsoft.com/office/drawing/2014/main" val="2530556966"/>
+                    </a:ext>
+                  </a:extLst>
+                </a:gridCol>
+              </a:tblGrid>
+              <a:tr h="370840">
+                <a:tc>
+                  <a:txBody>
+                    <a:bodyPr/>
+                    <a:lstStyle/>
+                    <a:p>
+                      <a:pPr algn="ctr"/>
+                      <a:r>
+                        <a:rPr lang="en-US" sz="2400" dirty="0" smtClean="0"/>
+                        <a:t>FK-to-X</a:t>
+                      </a:r>
+                      <a:endParaRPr lang="en-US" sz="2400" dirty="0"/>
+                    </a:p>
+                  </a:txBody>
+                  <a:tcPr/>
+                </a:tc>
+                <a:tc>
+                  <a:txBody>
+                    <a:bodyPr/>
+                    <a:lstStyle/>
+                    <a:p>
+                      <a:pPr algn="ctr"/>
+                      <a:r>
+                        <a:rPr lang="en-US" sz="2400" dirty="0" smtClean="0"/>
+                        <a:t>FK-to-Y</a:t>
+                      </a:r>
+                      <a:endParaRPr lang="en-US" sz="2400" dirty="0"/>
+                    </a:p>
+                  </a:txBody>
+                  <a:tcPr/>
+                </a:tc>
+                <a:extLst>
+                  <a:ext uri="{0D108BD9-81ED-4DB2-BD59-A6C34878D82A}">
+                    <a16:rowId xmlns:a16="http://schemas.microsoft.com/office/drawing/2014/main" val="3456338148"/>
+                  </a:ext>
+                </a:extLst>
+              </a:tr>
+              <a:tr h="370840">
+                <a:tc>
+                  <a:txBody>
+                    <a:bodyPr/>
+                    <a:lstStyle/>
+                    <a:p>
+                      <a:pPr algn="ctr"/>
+                      <a:r>
+                        <a:rPr lang="en-US" sz="2400" dirty="0" smtClean="0"/>
+                        <a:t>0</a:t>
+                      </a:r>
+                      <a:endParaRPr lang="en-US" sz="2400" dirty="0"/>
+                    </a:p>
+                  </a:txBody>
+                  <a:tcPr/>
+                </a:tc>
+                <a:tc>
+                  <a:txBody>
+                    <a:bodyPr/>
+                    <a:lstStyle/>
+                    <a:p>
+                      <a:pPr algn="ctr"/>
+                      <a:r>
+                        <a:rPr lang="en-US" sz="2400" dirty="0" smtClean="0"/>
+                        <a:t>b</a:t>
+                      </a:r>
+                      <a:endParaRPr lang="en-US" sz="2400" dirty="0"/>
+                    </a:p>
+                  </a:txBody>
+                  <a:tcPr/>
+                </a:tc>
+                <a:extLst>
+                  <a:ext uri="{0D108BD9-81ED-4DB2-BD59-A6C34878D82A}">
+                    <a16:rowId xmlns:a16="http://schemas.microsoft.com/office/drawing/2014/main" val="1574440097"/>
+                  </a:ext>
+                </a:extLst>
+              </a:tr>
+              <a:tr h="370840">
+                <a:tc>
+                  <a:txBody>
+                    <a:bodyPr/>
+                    <a:lstStyle/>
+                    <a:p>
+                      <a:pPr algn="ctr"/>
+                      <a:r>
+                        <a:rPr lang="en-US" sz="2400" dirty="0" smtClean="0"/>
+                        <a:t>0</a:t>
+                      </a:r>
+                      <a:endParaRPr lang="en-US" sz="2400" dirty="0"/>
+                    </a:p>
+                  </a:txBody>
+                  <a:tcPr/>
+                </a:tc>
+                <a:tc>
+                  <a:txBody>
+                    <a:bodyPr/>
+                    <a:lstStyle/>
+                    <a:p>
+                      <a:pPr algn="ctr"/>
+                      <a:r>
+                        <a:rPr lang="en-US" sz="2400" dirty="0" smtClean="0"/>
+                        <a:t>e</a:t>
+                      </a:r>
+                      <a:endParaRPr lang="en-US" sz="2400" dirty="0"/>
+                    </a:p>
+                  </a:txBody>
+                  <a:tcPr/>
+                </a:tc>
+                <a:extLst>
+                  <a:ext uri="{0D108BD9-81ED-4DB2-BD59-A6C34878D82A}">
+                    <a16:rowId xmlns:a16="http://schemas.microsoft.com/office/drawing/2014/main" val="3192370104"/>
+                  </a:ext>
+                </a:extLst>
+              </a:tr>
+              <a:tr h="370840">
+                <a:tc>
+                  <a:txBody>
+                    <a:bodyPr/>
+                    <a:lstStyle/>
+                    <a:p>
+                      <a:pPr algn="ctr"/>
+                      <a:r>
+                        <a:rPr lang="en-US" sz="2400" dirty="0" smtClean="0"/>
+                        <a:t>1</a:t>
+                      </a:r>
+                      <a:endParaRPr lang="en-US" sz="2400" dirty="0"/>
+                    </a:p>
+                  </a:txBody>
+                  <a:tcPr/>
+                </a:tc>
+                <a:tc>
+                  <a:txBody>
+                    <a:bodyPr/>
+                    <a:lstStyle/>
+                    <a:p>
+                      <a:pPr algn="ctr"/>
+                      <a:r>
+                        <a:rPr lang="en-US" sz="2400" dirty="0" smtClean="0"/>
+                        <a:t>e</a:t>
+                      </a:r>
+                      <a:endParaRPr lang="en-US" sz="2400" dirty="0"/>
+                    </a:p>
+                  </a:txBody>
+                  <a:tcPr/>
+                </a:tc>
+                <a:extLst>
+                  <a:ext uri="{0D108BD9-81ED-4DB2-BD59-A6C34878D82A}">
+                    <a16:rowId xmlns:a16="http://schemas.microsoft.com/office/drawing/2014/main" val="620129750"/>
+                  </a:ext>
+                </a:extLst>
+              </a:tr>
+            </a:tbl>
+          </a:graphicData>
+        </a:graphic>
+      </p:graphicFrame>
+      <p:cxnSp>
+        <p:nvCxnSpPr>
+          <p:cNvPr id="7" name="Straight Arrow Connector 6"/>
+          <p:cNvCxnSpPr/>
+          <p:nvPr/>
+        </p:nvCxnSpPr>
+        <p:spPr>
+          <a:xfrm flipH="1">
+            <a:off x="2232621" y="4528927"/>
+            <a:ext cx="1872311" cy="0"/>
+          </a:xfrm>
+          <a:prstGeom prst="straightConnector1">
+            <a:avLst/>
+          </a:prstGeom>
+          <a:ln w="57150">
+            <a:tailEnd type="triangle"/>
+          </a:ln>
+        </p:spPr>
+        <p:style>
+          <a:lnRef idx="1">
+            <a:schemeClr val="dk1"/>
+          </a:lnRef>
+          <a:fillRef idx="0">
+            <a:schemeClr val="dk1"/>
+          </a:fillRef>
+          <a:effectRef idx="0">
+            <a:schemeClr val="dk1"/>
+          </a:effectRef>
+          <a:fontRef idx="minor">
+            <a:schemeClr val="tx1"/>
+          </a:fontRef>
+        </p:style>
+      </p:cxnSp>
+      <p:cxnSp>
+        <p:nvCxnSpPr>
+          <p:cNvPr id="8" name="Straight Arrow Connector 7"/>
+          <p:cNvCxnSpPr/>
+          <p:nvPr/>
+        </p:nvCxnSpPr>
+        <p:spPr>
+          <a:xfrm flipH="1" flipV="1">
+            <a:off x="2232620" y="4681328"/>
+            <a:ext cx="1872312" cy="331427"/>
+          </a:xfrm>
+          <a:prstGeom prst="straightConnector1">
+            <a:avLst/>
+          </a:prstGeom>
+          <a:ln w="57150">
+            <a:tailEnd type="triangle"/>
+          </a:ln>
+        </p:spPr>
+        <p:style>
+          <a:lnRef idx="1">
+            <a:schemeClr val="dk1"/>
+          </a:lnRef>
+          <a:fillRef idx="0">
+            <a:schemeClr val="dk1"/>
+          </a:fillRef>
+          <a:effectRef idx="0">
+            <a:schemeClr val="dk1"/>
+          </a:effectRef>
+          <a:fontRef idx="minor">
+            <a:schemeClr val="tx1"/>
+          </a:fontRef>
+        </p:style>
+      </p:cxnSp>
+      <p:cxnSp>
+        <p:nvCxnSpPr>
+          <p:cNvPr id="9" name="Straight Arrow Connector 8"/>
+          <p:cNvCxnSpPr/>
+          <p:nvPr/>
+        </p:nvCxnSpPr>
+        <p:spPr>
+          <a:xfrm flipH="1" flipV="1">
+            <a:off x="2232620" y="5119105"/>
+            <a:ext cx="1872312" cy="321247"/>
+          </a:xfrm>
+          <a:prstGeom prst="straightConnector1">
+            <a:avLst/>
+          </a:prstGeom>
+          <a:ln w="57150">
+            <a:tailEnd type="triangle"/>
+          </a:ln>
+        </p:spPr>
+        <p:style>
+          <a:lnRef idx="1">
+            <a:schemeClr val="dk1"/>
+          </a:lnRef>
+          <a:fillRef idx="0">
+            <a:schemeClr val="dk1"/>
+          </a:fillRef>
+          <a:effectRef idx="0">
+            <a:schemeClr val="dk1"/>
+          </a:effectRef>
+          <a:fontRef idx="minor">
+            <a:schemeClr val="tx1"/>
+          </a:fontRef>
+        </p:style>
+      </p:cxnSp>
+      <p:cxnSp>
+        <p:nvCxnSpPr>
+          <p:cNvPr id="16" name="Straight Arrow Connector 15"/>
+          <p:cNvCxnSpPr/>
+          <p:nvPr/>
+        </p:nvCxnSpPr>
+        <p:spPr>
+          <a:xfrm>
+            <a:off x="7278652" y="4528146"/>
+            <a:ext cx="2178215" cy="438560"/>
+          </a:xfrm>
+          <a:prstGeom prst="straightConnector1">
+            <a:avLst/>
+          </a:prstGeom>
+          <a:ln w="57150">
+            <a:tailEnd type="triangle"/>
+          </a:ln>
+        </p:spPr>
+        <p:style>
+          <a:lnRef idx="1">
+            <a:schemeClr val="dk1"/>
+          </a:lnRef>
+          <a:fillRef idx="0">
+            <a:schemeClr val="dk1"/>
+          </a:fillRef>
+          <a:effectRef idx="0">
+            <a:schemeClr val="dk1"/>
+          </a:effectRef>
+          <a:fontRef idx="minor">
+            <a:schemeClr val="tx1"/>
+          </a:fontRef>
+        </p:style>
+      </p:cxnSp>
+      <p:cxnSp>
+        <p:nvCxnSpPr>
+          <p:cNvPr id="18" name="Straight Arrow Connector 17"/>
+          <p:cNvCxnSpPr/>
+          <p:nvPr/>
+        </p:nvCxnSpPr>
+        <p:spPr>
+          <a:xfrm>
+            <a:off x="7278652" y="5440352"/>
+            <a:ext cx="2178215" cy="1013076"/>
+          </a:xfrm>
+          <a:prstGeom prst="straightConnector1">
+            <a:avLst/>
+          </a:prstGeom>
+          <a:ln w="57150">
+            <a:tailEnd type="triangle"/>
+          </a:ln>
+        </p:spPr>
+        <p:style>
+          <a:lnRef idx="1">
+            <a:schemeClr val="dk1"/>
+          </a:lnRef>
+          <a:fillRef idx="0">
+            <a:schemeClr val="dk1"/>
+          </a:fillRef>
+          <a:effectRef idx="0">
+            <a:schemeClr val="dk1"/>
+          </a:effectRef>
+          <a:fontRef idx="minor">
+            <a:schemeClr val="tx1"/>
+          </a:fontRef>
+        </p:style>
+      </p:cxnSp>
+      <p:cxnSp>
+        <p:nvCxnSpPr>
+          <p:cNvPr id="19" name="Straight Arrow Connector 18"/>
+          <p:cNvCxnSpPr/>
+          <p:nvPr/>
+        </p:nvCxnSpPr>
+        <p:spPr>
+          <a:xfrm>
+            <a:off x="7278652" y="4966706"/>
+            <a:ext cx="2178215" cy="1328840"/>
+          </a:xfrm>
+          <a:prstGeom prst="straightConnector1">
+            <a:avLst/>
+          </a:prstGeom>
+          <a:ln w="57150">
+            <a:tailEnd type="triangle"/>
+          </a:ln>
+        </p:spPr>
+        <p:style>
+          <a:lnRef idx="1">
+            <a:schemeClr val="dk1"/>
+          </a:lnRef>
+          <a:fillRef idx="0">
+            <a:schemeClr val="dk1"/>
+          </a:fillRef>
+          <a:effectRef idx="0">
+            <a:schemeClr val="dk1"/>
+          </a:effectRef>
+          <a:fontRef idx="minor">
+            <a:schemeClr val="tx1"/>
+          </a:fontRef>
+        </p:style>
+      </p:cxnSp>
+    </p:spTree>
+    <p:extLst>
+      <p:ext uri="{BB962C8B-B14F-4D97-AF65-F5344CB8AC3E}">
+        <p14:creationId xmlns:p14="http://schemas.microsoft.com/office/powerpoint/2010/main" val="1517192088"/>
+      </p:ext>
+    </p:extLst>
+  </p:cSld>
+  <p:clrMapOvr>
+    <a:masterClrMapping/>
+  </p:clrMapOvr>
+</p:sld>
+</file>
+
+<file path=ppt/slides/slide7.xml><?xml version="1.0" encoding="utf-8"?>
+<p:sld xmlns:a="http://schemas.openxmlformats.org/drawingml/2006/main" xmlns:r="http://schemas.openxmlformats.org/officeDocument/2006/relationships" xmlns:p="http://schemas.openxmlformats.org/presentationml/2006/main">
+  <p:cSld>
+    <p:spTree>
+      <p:nvGrpSpPr>
+        <p:cNvPr id="1" name=""/>
+        <p:cNvGrpSpPr/>
+        <p:nvPr/>
+      </p:nvGrpSpPr>
+      <p:grpSpPr>
+        <a:xfrm>
+          <a:off x="0" y="0"/>
+          <a:ext cx="0" cy="0"/>
+          <a:chOff x="0" y="0"/>
+          <a:chExt cx="0" cy="0"/>
+        </a:xfrm>
+      </p:grpSpPr>
+      <p:sp>
+        <p:nvSpPr>
+          <p:cNvPr id="2" name="Title 1"/>
+          <p:cNvSpPr>
+            <a:spLocks noGrp="1"/>
+          </p:cNvSpPr>
+          <p:nvPr>
+            <p:ph type="title"/>
+          </p:nvPr>
+        </p:nvSpPr>
+        <p:spPr>
+          <a:xfrm>
+            <a:off x="838200" y="82256"/>
+            <a:ext cx="10515600" cy="1075546"/>
+          </a:xfrm>
+        </p:spPr>
+        <p:txBody>
+          <a:bodyPr/>
+          <a:lstStyle/>
+          <a:p>
+            <a:r>
+              <a:rPr lang="en-US" dirty="0" smtClean="0"/>
+              <a:t>1</a:t>
+            </a:r>
+            <a:r>
+              <a:rPr lang="en-US" dirty="0" smtClean="0"/>
+              <a:t>-to-Many Unidirectional</a:t>
+            </a:r>
+            <a:endParaRPr lang="en-US" dirty="0"/>
+          </a:p>
+        </p:txBody>
+      </p:sp>
+      <p:sp>
+        <p:nvSpPr>
+          <p:cNvPr id="3" name="Content Placeholder 2"/>
+          <p:cNvSpPr>
+            <a:spLocks noGrp="1"/>
+          </p:cNvSpPr>
+          <p:nvPr>
+            <p:ph idx="1"/>
+          </p:nvPr>
+        </p:nvSpPr>
+        <p:spPr>
+          <a:xfrm>
+            <a:off x="229937" y="1220409"/>
+            <a:ext cx="11774905" cy="2152439"/>
+          </a:xfrm>
+        </p:spPr>
+        <p:txBody>
+          <a:bodyPr>
+            <a:normAutofit lnSpcReduction="10000"/>
+          </a:bodyPr>
+          <a:lstStyle/>
+          <a:p>
+            <a:r>
+              <a:rPr lang="en-US" dirty="0" smtClean="0"/>
+              <a:t>If an </a:t>
+            </a:r>
+            <a:r>
+              <a:rPr lang="en-US" i="1" dirty="0" smtClean="0"/>
+              <a:t>X</a:t>
+            </a:r>
+            <a:r>
+              <a:rPr lang="en-US" dirty="0" smtClean="0"/>
+              <a:t> element has links to many </a:t>
+            </a:r>
+            <a:r>
+              <a:rPr lang="en-US" i="1" dirty="0" smtClean="0"/>
+              <a:t>Y</a:t>
+            </a:r>
+            <a:r>
+              <a:rPr lang="en-US" dirty="0" smtClean="0"/>
+              <a:t>s, and a </a:t>
+            </a:r>
+            <a:r>
+              <a:rPr lang="en-US" i="1" dirty="0" smtClean="0"/>
+              <a:t>Y</a:t>
+            </a:r>
+            <a:r>
+              <a:rPr lang="en-US" dirty="0" smtClean="0"/>
+              <a:t> </a:t>
+            </a:r>
+            <a:r>
+              <a:rPr lang="en-US" dirty="0" smtClean="0"/>
+              <a:t>has no link back</a:t>
+            </a:r>
+          </a:p>
+          <a:p>
+            <a:r>
+              <a:rPr lang="en-US" dirty="0" smtClean="0"/>
+              <a:t>Like Many-to-Many, but with </a:t>
+            </a:r>
+            <a:r>
+              <a:rPr lang="en-US" b="1" dirty="0" smtClean="0"/>
+              <a:t>UNIQUE</a:t>
+            </a:r>
+            <a:r>
+              <a:rPr lang="en-US" dirty="0" smtClean="0"/>
+              <a:t> constraint of </a:t>
+            </a:r>
+            <a:r>
+              <a:rPr lang="en-US" i="1" dirty="0" smtClean="0"/>
+              <a:t>FK-to-Y</a:t>
+            </a:r>
+            <a:endParaRPr lang="en-US" i="1" dirty="0" smtClean="0"/>
+          </a:p>
+          <a:p>
+            <a:r>
+              <a:rPr lang="en-US" dirty="0" err="1" smtClean="0"/>
+              <a:t>Eg</a:t>
+            </a:r>
+            <a:r>
+              <a:rPr lang="en-US" dirty="0" smtClean="0"/>
+              <a:t>, </a:t>
+            </a:r>
+            <a:r>
+              <a:rPr lang="en-US" dirty="0" smtClean="0"/>
+              <a:t>if </a:t>
+            </a:r>
+            <a:r>
+              <a:rPr lang="en-US" i="1" dirty="0" smtClean="0"/>
+              <a:t>0</a:t>
+            </a:r>
+            <a:r>
+              <a:rPr lang="en-US" dirty="0" smtClean="0"/>
+              <a:t> </a:t>
+            </a:r>
+            <a:r>
+              <a:rPr lang="en-US" dirty="0" smtClean="0"/>
+              <a:t>has link to </a:t>
+            </a:r>
+            <a:r>
+              <a:rPr lang="en-US" i="1" dirty="0" smtClean="0"/>
+              <a:t>b </a:t>
+            </a:r>
+            <a:r>
+              <a:rPr lang="en-US" dirty="0" smtClean="0"/>
+              <a:t>and </a:t>
+            </a:r>
+            <a:r>
+              <a:rPr lang="en-US" i="1" dirty="0" smtClean="0"/>
+              <a:t>e</a:t>
+            </a:r>
+            <a:r>
+              <a:rPr lang="en-US" dirty="0" smtClean="0"/>
+              <a:t>, </a:t>
+            </a:r>
+            <a:r>
+              <a:rPr lang="en-US" i="1" dirty="0" smtClean="0"/>
+              <a:t>e </a:t>
+            </a:r>
+            <a:r>
+              <a:rPr lang="en-US" dirty="0" smtClean="0"/>
+              <a:t>cannot be used in any other relation</a:t>
+            </a:r>
+            <a:endParaRPr lang="en-US" i="1" dirty="0"/>
+          </a:p>
+        </p:txBody>
+      </p:sp>
+      <p:graphicFrame>
+        <p:nvGraphicFramePr>
+          <p:cNvPr id="4" name="Table 3"/>
+          <p:cNvGraphicFramePr>
+            <a:graphicFrameLocks noGrp="1"/>
+          </p:cNvGraphicFramePr>
+          <p:nvPr>
+            <p:extLst>
+              <p:ext uri="{D42A27DB-BD31-4B8C-83A1-F6EECF244321}">
+                <p14:modId xmlns:p14="http://schemas.microsoft.com/office/powerpoint/2010/main" val="2494123472"/>
+              </p:ext>
+            </p:extLst>
+          </p:nvPr>
+        </p:nvGraphicFramePr>
+        <p:xfrm>
+          <a:off x="889970" y="3846494"/>
+          <a:ext cx="1219199" cy="1371600"/>
+        </p:xfrm>
+        <a:graphic>
+          <a:graphicData uri="http://schemas.openxmlformats.org/drawingml/2006/table">
+            <a:tbl>
+              <a:tblPr firstRow="1" bandRow="1">
+                <a:tableStyleId>{5C22544A-7EE6-4342-B048-85BDC9FD1C3A}</a:tableStyleId>
+              </a:tblPr>
+              <a:tblGrid>
+                <a:gridCol w="1219199">
+                  <a:extLst>
+                    <a:ext uri="{9D8B030D-6E8A-4147-A177-3AD203B41FA5}">
+                      <a16:colId xmlns:a16="http://schemas.microsoft.com/office/drawing/2014/main" val="1636146242"/>
+                    </a:ext>
+                  </a:extLst>
+                </a:gridCol>
+              </a:tblGrid>
+              <a:tr h="370840">
+                <a:tc>
+                  <a:txBody>
+                    <a:bodyPr/>
+                    <a:lstStyle/>
+                    <a:p>
+                      <a:pPr algn="ctr"/>
+                      <a:r>
+                        <a:rPr lang="en-US" sz="2400" dirty="0" smtClean="0"/>
+                        <a:t>X-PK</a:t>
+                      </a:r>
+                      <a:endParaRPr lang="en-US" sz="2400" dirty="0"/>
+                    </a:p>
+                  </a:txBody>
+                  <a:tcPr/>
+                </a:tc>
+                <a:extLst>
+                  <a:ext uri="{0D108BD9-81ED-4DB2-BD59-A6C34878D82A}">
+                    <a16:rowId xmlns:a16="http://schemas.microsoft.com/office/drawing/2014/main" val="3010766445"/>
+                  </a:ext>
+                </a:extLst>
+              </a:tr>
+              <a:tr h="370840">
+                <a:tc>
+                  <a:txBody>
+                    <a:bodyPr/>
+                    <a:lstStyle/>
+                    <a:p>
+                      <a:pPr algn="ctr"/>
+                      <a:r>
+                        <a:rPr lang="en-US" sz="2400" dirty="0" smtClean="0"/>
+                        <a:t>0</a:t>
+                      </a:r>
+                      <a:endParaRPr lang="en-US" sz="2400" dirty="0"/>
+                    </a:p>
+                  </a:txBody>
+                  <a:tcPr/>
+                </a:tc>
+                <a:extLst>
+                  <a:ext uri="{0D108BD9-81ED-4DB2-BD59-A6C34878D82A}">
+                    <a16:rowId xmlns:a16="http://schemas.microsoft.com/office/drawing/2014/main" val="4239011705"/>
+                  </a:ext>
+                </a:extLst>
+              </a:tr>
+              <a:tr h="370840">
+                <a:tc>
+                  <a:txBody>
+                    <a:bodyPr/>
+                    <a:lstStyle/>
+                    <a:p>
+                      <a:pPr algn="ctr"/>
+                      <a:r>
+                        <a:rPr lang="en-US" sz="2400" dirty="0" smtClean="0"/>
+                        <a:t>1</a:t>
+                      </a:r>
+                      <a:endParaRPr lang="en-US" sz="2400" dirty="0"/>
+                    </a:p>
+                  </a:txBody>
+                  <a:tcPr/>
+                </a:tc>
+                <a:extLst>
+                  <a:ext uri="{0D108BD9-81ED-4DB2-BD59-A6C34878D82A}">
+                    <a16:rowId xmlns:a16="http://schemas.microsoft.com/office/drawing/2014/main" val="3324439667"/>
+                  </a:ext>
+                </a:extLst>
+              </a:tr>
+            </a:tbl>
+          </a:graphicData>
+        </a:graphic>
+      </p:graphicFrame>
+      <p:graphicFrame>
+        <p:nvGraphicFramePr>
+          <p:cNvPr id="5" name="Table 4"/>
+          <p:cNvGraphicFramePr>
+            <a:graphicFrameLocks noGrp="1"/>
+          </p:cNvGraphicFramePr>
+          <p:nvPr>
+            <p:extLst>
+              <p:ext uri="{D42A27DB-BD31-4B8C-83A1-F6EECF244321}">
+                <p14:modId xmlns:p14="http://schemas.microsoft.com/office/powerpoint/2010/main" val="3748651641"/>
+              </p:ext>
+            </p:extLst>
+          </p:nvPr>
+        </p:nvGraphicFramePr>
+        <p:xfrm>
+          <a:off x="9593370" y="3846494"/>
+          <a:ext cx="1668379" cy="2743200"/>
+        </p:xfrm>
+        <a:graphic>
+          <a:graphicData uri="http://schemas.openxmlformats.org/drawingml/2006/table">
+            <a:tbl>
+              <a:tblPr firstRow="1" bandRow="1">
+                <a:tableStyleId>{00A15C55-8517-42AA-B614-E9B94910E393}</a:tableStyleId>
+              </a:tblPr>
+              <a:tblGrid>
+                <a:gridCol w="1668379">
+                  <a:extLst>
+                    <a:ext uri="{9D8B030D-6E8A-4147-A177-3AD203B41FA5}">
+                      <a16:colId xmlns:a16="http://schemas.microsoft.com/office/drawing/2014/main" val="3161174791"/>
+                    </a:ext>
+                  </a:extLst>
+                </a:gridCol>
+              </a:tblGrid>
+              <a:tr h="370840">
+                <a:tc>
+                  <a:txBody>
+                    <a:bodyPr/>
+                    <a:lstStyle/>
+                    <a:p>
+                      <a:pPr algn="ctr"/>
+                      <a:r>
+                        <a:rPr lang="en-US" sz="2400" dirty="0" smtClean="0"/>
+                        <a:t>Y-PK</a:t>
+                      </a:r>
+                      <a:endParaRPr lang="en-US" sz="2400" dirty="0"/>
+                    </a:p>
+                  </a:txBody>
+                  <a:tcPr/>
+                </a:tc>
+                <a:extLst>
+                  <a:ext uri="{0D108BD9-81ED-4DB2-BD59-A6C34878D82A}">
+                    <a16:rowId xmlns:a16="http://schemas.microsoft.com/office/drawing/2014/main" val="1018849219"/>
+                  </a:ext>
+                </a:extLst>
+              </a:tr>
+              <a:tr h="370840">
+                <a:tc>
+                  <a:txBody>
+                    <a:bodyPr/>
+                    <a:lstStyle/>
+                    <a:p>
+                      <a:pPr algn="ctr"/>
+                      <a:r>
+                        <a:rPr lang="en-US" sz="2400" dirty="0" smtClean="0"/>
+                        <a:t>a</a:t>
+                      </a:r>
+                      <a:endParaRPr lang="en-US" sz="2400" dirty="0"/>
+                    </a:p>
+                  </a:txBody>
+                  <a:tcPr/>
+                </a:tc>
+                <a:extLst>
+                  <a:ext uri="{0D108BD9-81ED-4DB2-BD59-A6C34878D82A}">
+                    <a16:rowId xmlns:a16="http://schemas.microsoft.com/office/drawing/2014/main" val="2415621694"/>
+                  </a:ext>
+                </a:extLst>
+              </a:tr>
+              <a:tr h="370840">
+                <a:tc>
+                  <a:txBody>
+                    <a:bodyPr/>
+                    <a:lstStyle/>
+                    <a:p>
+                      <a:pPr algn="ctr"/>
+                      <a:r>
+                        <a:rPr lang="en-US" sz="2400" dirty="0" smtClean="0"/>
+                        <a:t>b</a:t>
+                      </a:r>
+                      <a:endParaRPr lang="en-US" sz="2400" dirty="0"/>
+                    </a:p>
+                  </a:txBody>
+                  <a:tcPr/>
+                </a:tc>
+                <a:extLst>
+                  <a:ext uri="{0D108BD9-81ED-4DB2-BD59-A6C34878D82A}">
+                    <a16:rowId xmlns:a16="http://schemas.microsoft.com/office/drawing/2014/main" val="3368192205"/>
+                  </a:ext>
+                </a:extLst>
+              </a:tr>
+              <a:tr h="370840">
+                <a:tc>
+                  <a:txBody>
+                    <a:bodyPr/>
+                    <a:lstStyle/>
+                    <a:p>
+                      <a:pPr algn="ctr"/>
+                      <a:r>
+                        <a:rPr lang="en-US" sz="2400" dirty="0" smtClean="0"/>
+                        <a:t>c</a:t>
+                      </a:r>
+                      <a:endParaRPr lang="en-US" sz="2400" dirty="0"/>
+                    </a:p>
+                  </a:txBody>
+                  <a:tcPr/>
+                </a:tc>
+                <a:extLst>
+                  <a:ext uri="{0D108BD9-81ED-4DB2-BD59-A6C34878D82A}">
+                    <a16:rowId xmlns:a16="http://schemas.microsoft.com/office/drawing/2014/main" val="1690100288"/>
+                  </a:ext>
+                </a:extLst>
+              </a:tr>
+              <a:tr h="370840">
+                <a:tc>
+                  <a:txBody>
+                    <a:bodyPr/>
+                    <a:lstStyle/>
+                    <a:p>
+                      <a:pPr algn="ctr"/>
+                      <a:r>
+                        <a:rPr lang="en-US" sz="2400" dirty="0" smtClean="0"/>
+                        <a:t>d</a:t>
+                      </a:r>
+                      <a:endParaRPr lang="en-US" sz="2400" dirty="0"/>
+                    </a:p>
+                  </a:txBody>
+                  <a:tcPr/>
+                </a:tc>
+                <a:extLst>
+                  <a:ext uri="{0D108BD9-81ED-4DB2-BD59-A6C34878D82A}">
+                    <a16:rowId xmlns:a16="http://schemas.microsoft.com/office/drawing/2014/main" val="1833299649"/>
+                  </a:ext>
+                </a:extLst>
+              </a:tr>
+              <a:tr h="370840">
+                <a:tc>
+                  <a:txBody>
+                    <a:bodyPr/>
+                    <a:lstStyle/>
+                    <a:p>
+                      <a:pPr algn="ctr"/>
+                      <a:r>
+                        <a:rPr lang="en-US" sz="2400" dirty="0" smtClean="0"/>
+                        <a:t>e</a:t>
+                      </a:r>
+                      <a:endParaRPr lang="en-US" sz="2400" dirty="0"/>
+                    </a:p>
+                  </a:txBody>
+                  <a:tcPr/>
+                </a:tc>
+                <a:extLst>
+                  <a:ext uri="{0D108BD9-81ED-4DB2-BD59-A6C34878D82A}">
+                    <a16:rowId xmlns:a16="http://schemas.microsoft.com/office/drawing/2014/main" val="928400680"/>
+                  </a:ext>
+                </a:extLst>
+              </a:tr>
+            </a:tbl>
+          </a:graphicData>
+        </a:graphic>
+      </p:graphicFrame>
+      <p:graphicFrame>
+        <p:nvGraphicFramePr>
+          <p:cNvPr id="6" name="Table 5"/>
+          <p:cNvGraphicFramePr>
+            <a:graphicFrameLocks noGrp="1"/>
+          </p:cNvGraphicFramePr>
+          <p:nvPr>
+            <p:extLst>
+              <p:ext uri="{D42A27DB-BD31-4B8C-83A1-F6EECF244321}">
+                <p14:modId xmlns:p14="http://schemas.microsoft.com/office/powerpoint/2010/main" val="805582132"/>
+              </p:ext>
+            </p:extLst>
+          </p:nvPr>
+        </p:nvGraphicFramePr>
+        <p:xfrm>
+          <a:off x="4177294" y="3478111"/>
+          <a:ext cx="3028996" cy="2194560"/>
+        </p:xfrm>
+        <a:graphic>
+          <a:graphicData uri="http://schemas.openxmlformats.org/drawingml/2006/table">
+            <a:tbl>
+              <a:tblPr firstRow="1" bandRow="1">
+                <a:tableStyleId>{073A0DAA-6AF3-43AB-8588-CEC1D06C72B9}</a:tableStyleId>
+              </a:tblPr>
+              <a:tblGrid>
+                <a:gridCol w="1514498">
+                  <a:extLst>
+                    <a:ext uri="{9D8B030D-6E8A-4147-A177-3AD203B41FA5}">
+                      <a16:colId xmlns:a16="http://schemas.microsoft.com/office/drawing/2014/main" val="3894862203"/>
+                    </a:ext>
+                  </a:extLst>
+                </a:gridCol>
+                <a:gridCol w="1514498">
+                  <a:extLst>
+                    <a:ext uri="{9D8B030D-6E8A-4147-A177-3AD203B41FA5}">
+                      <a16:colId xmlns:a16="http://schemas.microsoft.com/office/drawing/2014/main" val="2530556966"/>
+                    </a:ext>
+                  </a:extLst>
+                </a:gridCol>
+              </a:tblGrid>
+              <a:tr h="370840">
+                <a:tc>
+                  <a:txBody>
+                    <a:bodyPr/>
+                    <a:lstStyle/>
+                    <a:p>
+                      <a:pPr algn="ctr"/>
+                      <a:r>
+                        <a:rPr lang="en-US" sz="2400" dirty="0" smtClean="0"/>
+                        <a:t>FK-to-X</a:t>
+                      </a:r>
+                      <a:endParaRPr lang="en-US" sz="2400" dirty="0"/>
+                    </a:p>
+                  </a:txBody>
+                  <a:tcPr/>
+                </a:tc>
+                <a:tc>
+                  <a:txBody>
+                    <a:bodyPr/>
+                    <a:lstStyle/>
+                    <a:p>
+                      <a:pPr algn="ctr"/>
+                      <a:r>
+                        <a:rPr lang="en-US" sz="2400" dirty="0" smtClean="0"/>
+                        <a:t>Unique</a:t>
+                      </a:r>
+                    </a:p>
+                    <a:p>
+                      <a:pPr algn="ctr"/>
+                      <a:r>
+                        <a:rPr lang="en-US" sz="2400" dirty="0" smtClean="0"/>
+                        <a:t>FK-to-Y</a:t>
+                      </a:r>
+                      <a:endParaRPr lang="en-US" sz="2400" dirty="0"/>
+                    </a:p>
+                  </a:txBody>
+                  <a:tcPr/>
+                </a:tc>
+                <a:extLst>
+                  <a:ext uri="{0D108BD9-81ED-4DB2-BD59-A6C34878D82A}">
+                    <a16:rowId xmlns:a16="http://schemas.microsoft.com/office/drawing/2014/main" val="3456338148"/>
+                  </a:ext>
+                </a:extLst>
+              </a:tr>
+              <a:tr h="370840">
+                <a:tc>
+                  <a:txBody>
+                    <a:bodyPr/>
+                    <a:lstStyle/>
+                    <a:p>
+                      <a:pPr algn="ctr"/>
+                      <a:r>
+                        <a:rPr lang="en-US" sz="2400" dirty="0" smtClean="0"/>
+                        <a:t>0</a:t>
+                      </a:r>
+                      <a:endParaRPr lang="en-US" sz="2400" dirty="0"/>
+                    </a:p>
+                  </a:txBody>
+                  <a:tcPr/>
+                </a:tc>
+                <a:tc>
+                  <a:txBody>
+                    <a:bodyPr/>
+                    <a:lstStyle/>
+                    <a:p>
+                      <a:pPr algn="ctr"/>
+                      <a:r>
+                        <a:rPr lang="en-US" sz="2400" dirty="0" smtClean="0"/>
+                        <a:t>b</a:t>
+                      </a:r>
+                      <a:endParaRPr lang="en-US" sz="2400" dirty="0"/>
+                    </a:p>
+                  </a:txBody>
+                  <a:tcPr/>
+                </a:tc>
+                <a:extLst>
+                  <a:ext uri="{0D108BD9-81ED-4DB2-BD59-A6C34878D82A}">
+                    <a16:rowId xmlns:a16="http://schemas.microsoft.com/office/drawing/2014/main" val="1574440097"/>
+                  </a:ext>
+                </a:extLst>
+              </a:tr>
+              <a:tr h="370840">
+                <a:tc>
+                  <a:txBody>
+                    <a:bodyPr/>
+                    <a:lstStyle/>
+                    <a:p>
+                      <a:pPr algn="ctr"/>
+                      <a:r>
+                        <a:rPr lang="en-US" sz="2400" dirty="0" smtClean="0"/>
+                        <a:t>0</a:t>
+                      </a:r>
+                      <a:endParaRPr lang="en-US" sz="2400" dirty="0"/>
+                    </a:p>
+                  </a:txBody>
+                  <a:tcPr/>
+                </a:tc>
+                <a:tc>
+                  <a:txBody>
+                    <a:bodyPr/>
+                    <a:lstStyle/>
+                    <a:p>
+                      <a:pPr algn="ctr"/>
+                      <a:r>
+                        <a:rPr lang="en-US" sz="2400" dirty="0" smtClean="0"/>
+                        <a:t>e</a:t>
+                      </a:r>
+                      <a:endParaRPr lang="en-US" sz="2400" dirty="0"/>
+                    </a:p>
+                  </a:txBody>
+                  <a:tcPr/>
+                </a:tc>
+                <a:extLst>
+                  <a:ext uri="{0D108BD9-81ED-4DB2-BD59-A6C34878D82A}">
+                    <a16:rowId xmlns:a16="http://schemas.microsoft.com/office/drawing/2014/main" val="3192370104"/>
+                  </a:ext>
+                </a:extLst>
+              </a:tr>
+              <a:tr h="370840">
+                <a:tc>
+                  <a:txBody>
+                    <a:bodyPr/>
+                    <a:lstStyle/>
+                    <a:p>
+                      <a:pPr algn="ctr"/>
+                      <a:r>
+                        <a:rPr lang="en-US" sz="2400" dirty="0" smtClean="0"/>
+                        <a:t>1</a:t>
+                      </a:r>
+                      <a:endParaRPr lang="en-US" sz="2400" dirty="0"/>
+                    </a:p>
+                  </a:txBody>
+                  <a:tcPr/>
+                </a:tc>
+                <a:tc>
+                  <a:txBody>
+                    <a:bodyPr/>
+                    <a:lstStyle/>
+                    <a:p>
+                      <a:pPr algn="ctr"/>
+                      <a:r>
+                        <a:rPr lang="en-US" sz="2400" dirty="0" smtClean="0"/>
+                        <a:t>e</a:t>
+                      </a:r>
+                      <a:endParaRPr lang="en-US" sz="2400" dirty="0"/>
+                    </a:p>
+                  </a:txBody>
+                  <a:tcPr>
+                    <a:solidFill>
+                      <a:srgbClr val="FF0000"/>
+                    </a:solidFill>
+                  </a:tcPr>
+                </a:tc>
+                <a:extLst>
+                  <a:ext uri="{0D108BD9-81ED-4DB2-BD59-A6C34878D82A}">
+                    <a16:rowId xmlns:a16="http://schemas.microsoft.com/office/drawing/2014/main" val="620129750"/>
+                  </a:ext>
+                </a:extLst>
+              </a:tr>
+            </a:tbl>
+          </a:graphicData>
+        </a:graphic>
+      </p:graphicFrame>
+      <p:cxnSp>
+        <p:nvCxnSpPr>
+          <p:cNvPr id="7" name="Straight Arrow Connector 6"/>
+          <p:cNvCxnSpPr/>
+          <p:nvPr/>
+        </p:nvCxnSpPr>
+        <p:spPr>
+          <a:xfrm flipH="1">
+            <a:off x="2232621" y="4528927"/>
+            <a:ext cx="1872311" cy="0"/>
+          </a:xfrm>
+          <a:prstGeom prst="straightConnector1">
+            <a:avLst/>
+          </a:prstGeom>
+          <a:ln w="57150">
+            <a:tailEnd type="triangle"/>
+          </a:ln>
+        </p:spPr>
+        <p:style>
+          <a:lnRef idx="1">
+            <a:schemeClr val="dk1"/>
+          </a:lnRef>
+          <a:fillRef idx="0">
+            <a:schemeClr val="dk1"/>
+          </a:fillRef>
+          <a:effectRef idx="0">
+            <a:schemeClr val="dk1"/>
+          </a:effectRef>
+          <a:fontRef idx="minor">
+            <a:schemeClr val="tx1"/>
+          </a:fontRef>
+        </p:style>
+      </p:cxnSp>
+      <p:cxnSp>
+        <p:nvCxnSpPr>
+          <p:cNvPr id="8" name="Straight Arrow Connector 7"/>
+          <p:cNvCxnSpPr/>
+          <p:nvPr/>
+        </p:nvCxnSpPr>
+        <p:spPr>
+          <a:xfrm flipH="1" flipV="1">
+            <a:off x="2232620" y="4681328"/>
+            <a:ext cx="1872312" cy="331427"/>
+          </a:xfrm>
+          <a:prstGeom prst="straightConnector1">
+            <a:avLst/>
+          </a:prstGeom>
+          <a:ln w="57150">
+            <a:tailEnd type="triangle"/>
+          </a:ln>
+        </p:spPr>
+        <p:style>
+          <a:lnRef idx="1">
+            <a:schemeClr val="dk1"/>
+          </a:lnRef>
+          <a:fillRef idx="0">
+            <a:schemeClr val="dk1"/>
+          </a:fillRef>
+          <a:effectRef idx="0">
+            <a:schemeClr val="dk1"/>
+          </a:effectRef>
+          <a:fontRef idx="minor">
+            <a:schemeClr val="tx1"/>
+          </a:fontRef>
+        </p:style>
+      </p:cxnSp>
+      <p:cxnSp>
+        <p:nvCxnSpPr>
+          <p:cNvPr id="9" name="Straight Arrow Connector 8"/>
+          <p:cNvCxnSpPr/>
+          <p:nvPr/>
+        </p:nvCxnSpPr>
+        <p:spPr>
+          <a:xfrm flipH="1" flipV="1">
+            <a:off x="2232620" y="5119105"/>
+            <a:ext cx="1872312" cy="321247"/>
+          </a:xfrm>
+          <a:prstGeom prst="straightConnector1">
+            <a:avLst/>
+          </a:prstGeom>
+          <a:ln w="57150">
+            <a:tailEnd type="triangle"/>
+          </a:ln>
+        </p:spPr>
+        <p:style>
+          <a:lnRef idx="1">
+            <a:schemeClr val="dk1"/>
+          </a:lnRef>
+          <a:fillRef idx="0">
+            <a:schemeClr val="dk1"/>
+          </a:fillRef>
+          <a:effectRef idx="0">
+            <a:schemeClr val="dk1"/>
+          </a:effectRef>
+          <a:fontRef idx="minor">
+            <a:schemeClr val="tx1"/>
+          </a:fontRef>
+        </p:style>
+      </p:cxnSp>
+      <p:cxnSp>
+        <p:nvCxnSpPr>
+          <p:cNvPr id="16" name="Straight Arrow Connector 15"/>
+          <p:cNvCxnSpPr/>
+          <p:nvPr/>
+        </p:nvCxnSpPr>
+        <p:spPr>
+          <a:xfrm>
+            <a:off x="7278652" y="4528146"/>
+            <a:ext cx="2178215" cy="438560"/>
+          </a:xfrm>
+          <a:prstGeom prst="straightConnector1">
+            <a:avLst/>
+          </a:prstGeom>
+          <a:ln w="57150">
+            <a:tailEnd type="triangle"/>
+          </a:ln>
+        </p:spPr>
+        <p:style>
+          <a:lnRef idx="1">
+            <a:schemeClr val="dk1"/>
+          </a:lnRef>
+          <a:fillRef idx="0">
+            <a:schemeClr val="dk1"/>
+          </a:fillRef>
+          <a:effectRef idx="0">
+            <a:schemeClr val="dk1"/>
+          </a:effectRef>
+          <a:fontRef idx="minor">
+            <a:schemeClr val="tx1"/>
+          </a:fontRef>
+        </p:style>
+      </p:cxnSp>
+      <p:cxnSp>
+        <p:nvCxnSpPr>
+          <p:cNvPr id="19" name="Straight Arrow Connector 18"/>
+          <p:cNvCxnSpPr/>
+          <p:nvPr/>
+        </p:nvCxnSpPr>
+        <p:spPr>
+          <a:xfrm>
+            <a:off x="7278652" y="4966706"/>
+            <a:ext cx="2178215" cy="1328840"/>
+          </a:xfrm>
+          <a:prstGeom prst="straightConnector1">
+            <a:avLst/>
+          </a:prstGeom>
+          <a:ln w="57150">
+            <a:tailEnd type="triangle"/>
+          </a:ln>
+        </p:spPr>
+        <p:style>
+          <a:lnRef idx="1">
+            <a:schemeClr val="dk1"/>
+          </a:lnRef>
+          <a:fillRef idx="0">
+            <a:schemeClr val="dk1"/>
+          </a:fillRef>
+          <a:effectRef idx="0">
+            <a:schemeClr val="dk1"/>
+          </a:effectRef>
+          <a:fontRef idx="minor">
+            <a:schemeClr val="tx1"/>
+          </a:fontRef>
+        </p:style>
+      </p:cxnSp>
+    </p:spTree>
+    <p:extLst>
+      <p:ext uri="{BB962C8B-B14F-4D97-AF65-F5344CB8AC3E}">
+        <p14:creationId xmlns:p14="http://schemas.microsoft.com/office/powerpoint/2010/main" val="1807090536"/>
+      </p:ext>
+    </p:extLst>
+  </p:cSld>
+  <p:clrMapOvr>
+    <a:masterClrMapping/>
+  </p:clrMapOvr>
+</p:sld>
+</file>
+
+<file path=ppt/slides/slide8.xml><?xml version="1.0" encoding="utf-8"?>
+<p:sld xmlns:a="http://schemas.openxmlformats.org/drawingml/2006/main" xmlns:r="http://schemas.openxmlformats.org/officeDocument/2006/relationships" xmlns:p="http://schemas.openxmlformats.org/presentationml/2006/main">
+  <p:cSld>
+    <p:spTree>
+      <p:nvGrpSpPr>
+        <p:cNvPr id="1" name=""/>
+        <p:cNvGrpSpPr/>
+        <p:nvPr/>
+      </p:nvGrpSpPr>
+      <p:grpSpPr>
+        <a:xfrm>
+          <a:off x="0" y="0"/>
+          <a:ext cx="0" cy="0"/>
+          <a:chOff x="0" y="0"/>
+          <a:chExt cx="0" cy="0"/>
+        </a:xfrm>
+      </p:grpSpPr>
+      <p:sp>
+        <p:nvSpPr>
+          <p:cNvPr id="2" name="Title 1"/>
+          <p:cNvSpPr>
+            <a:spLocks noGrp="1"/>
+          </p:cNvSpPr>
+          <p:nvPr>
+            <p:ph type="title"/>
+          </p:nvPr>
+        </p:nvSpPr>
+        <p:spPr>
+          <a:xfrm>
             <a:off x="838200" y="180933"/>
             <a:ext cx="10515600" cy="1038227"/>
           </a:xfrm>
@@ -5409,7 +7247,7 @@
           <a:p>
             <a:r>
               <a:rPr lang="en-US" dirty="0" smtClean="0"/>
-              <a:t>1-To-Many</a:t>
+              <a:t>1-To-Many Bidirectional</a:t>
             </a:r>
             <a:endParaRPr lang="en-US" dirty="0"/>
           </a:p>
@@ -5511,28 +7349,10 @@
           </a:p>
           <a:p>
             <a:r>
-              <a:rPr lang="en-US" dirty="0" smtClean="0"/>
-              <a:t>Here </a:t>
-            </a:r>
-            <a:r>
-              <a:rPr lang="en-US" dirty="0" err="1" smtClean="0"/>
-              <a:t>uni</a:t>
-            </a:r>
-            <a:r>
-              <a:rPr lang="en-US" dirty="0" smtClean="0"/>
-              <a:t>/bi-</a:t>
-            </a:r>
-            <a:r>
-              <a:rPr lang="en-US" dirty="0" err="1" smtClean="0"/>
-              <a:t>directionals</a:t>
-            </a:r>
-            <a:r>
-              <a:rPr lang="en-US" dirty="0" smtClean="0"/>
-              <a:t> will use the same SQL tables</a:t>
-            </a:r>
-          </a:p>
-          <a:p>
-            <a:endParaRPr lang="en-US" dirty="0"/>
+              <a:rPr lang="en-US" i="1" dirty="0" smtClean="0"/>
+              <a:t>Better to have bidirectional than unidirectional</a:t>
+            </a:r>
+            <a:endParaRPr lang="en-US" i="1" dirty="0" smtClean="0"/>
           </a:p>
         </p:txBody>
       </p:sp>
@@ -6083,998 +7903,6 @@
 </p:sld>
 </file>
 
-<file path=ppt/slides/slide7.xml><?xml version="1.0" encoding="utf-8"?>
-<p:sld xmlns:a="http://schemas.openxmlformats.org/drawingml/2006/main" xmlns:r="http://schemas.openxmlformats.org/officeDocument/2006/relationships" xmlns:p="http://schemas.openxmlformats.org/presentationml/2006/main">
-  <p:cSld>
-    <p:spTree>
-      <p:nvGrpSpPr>
-        <p:cNvPr id="1" name=""/>
-        <p:cNvGrpSpPr/>
-        <p:nvPr/>
-      </p:nvGrpSpPr>
-      <p:grpSpPr>
-        <a:xfrm>
-          <a:off x="0" y="0"/>
-          <a:ext cx="0" cy="0"/>
-          <a:chOff x="0" y="0"/>
-          <a:chExt cx="0" cy="0"/>
-        </a:xfrm>
-      </p:grpSpPr>
-      <p:sp>
-        <p:nvSpPr>
-          <p:cNvPr id="2" name="Title 1"/>
-          <p:cNvSpPr>
-            <a:spLocks noGrp="1"/>
-          </p:cNvSpPr>
-          <p:nvPr>
-            <p:ph type="title"/>
-          </p:nvPr>
-        </p:nvSpPr>
-        <p:spPr>
-          <a:xfrm>
-            <a:off x="838200" y="82256"/>
-            <a:ext cx="10515600" cy="1075546"/>
-          </a:xfrm>
-        </p:spPr>
-        <p:txBody>
-          <a:bodyPr/>
-          <a:lstStyle/>
-          <a:p>
-            <a:r>
-              <a:rPr lang="en-US" dirty="0" smtClean="0"/>
-              <a:t>Many-to-Many</a:t>
-            </a:r>
-            <a:endParaRPr lang="en-US" dirty="0"/>
-          </a:p>
-        </p:txBody>
-      </p:sp>
-      <p:sp>
-        <p:nvSpPr>
-          <p:cNvPr id="3" name="Content Placeholder 2"/>
-          <p:cNvSpPr>
-            <a:spLocks noGrp="1"/>
-          </p:cNvSpPr>
-          <p:nvPr>
-            <p:ph idx="1"/>
-          </p:nvPr>
-        </p:nvSpPr>
-        <p:spPr>
-          <a:xfrm>
-            <a:off x="229937" y="1220409"/>
-            <a:ext cx="11774905" cy="2152439"/>
-          </a:xfrm>
-        </p:spPr>
-        <p:txBody>
-          <a:bodyPr/>
-          <a:lstStyle/>
-          <a:p>
-            <a:r>
-              <a:rPr lang="en-US" dirty="0" smtClean="0"/>
-              <a:t>If an </a:t>
-            </a:r>
-            <a:r>
-              <a:rPr lang="en-US" i="1" dirty="0" smtClean="0"/>
-              <a:t>X</a:t>
-            </a:r>
-            <a:r>
-              <a:rPr lang="en-US" dirty="0" smtClean="0"/>
-              <a:t> element has links to many </a:t>
-            </a:r>
-            <a:r>
-              <a:rPr lang="en-US" i="1" dirty="0" smtClean="0"/>
-              <a:t>Y</a:t>
-            </a:r>
-            <a:r>
-              <a:rPr lang="en-US" dirty="0" smtClean="0"/>
-              <a:t>s, and a </a:t>
-            </a:r>
-            <a:r>
-              <a:rPr lang="en-US" i="1" dirty="0" smtClean="0"/>
-              <a:t>Y</a:t>
-            </a:r>
-            <a:r>
-              <a:rPr lang="en-US" dirty="0" smtClean="0"/>
-              <a:t> can have links to many </a:t>
-            </a:r>
-            <a:r>
-              <a:rPr lang="en-US" i="1" dirty="0" err="1" smtClean="0"/>
-              <a:t>X</a:t>
-            </a:r>
-            <a:r>
-              <a:rPr lang="en-US" dirty="0" err="1" smtClean="0"/>
-              <a:t>s</a:t>
-            </a:r>
-            <a:r>
-              <a:rPr lang="en-US" dirty="0" smtClean="0"/>
-              <a:t>, we need a third table with 2 FKs</a:t>
-            </a:r>
-          </a:p>
-          <a:p>
-            <a:r>
-              <a:rPr lang="en-US" dirty="0" err="1" smtClean="0"/>
-              <a:t>Eg</a:t>
-            </a:r>
-            <a:r>
-              <a:rPr lang="en-US" dirty="0" smtClean="0"/>
-              <a:t>, </a:t>
-            </a:r>
-            <a:r>
-              <a:rPr lang="en-US" i="1" dirty="0" smtClean="0"/>
-              <a:t>0</a:t>
-            </a:r>
-            <a:r>
-              <a:rPr lang="en-US" dirty="0" smtClean="0"/>
-              <a:t> has link to </a:t>
-            </a:r>
-            <a:r>
-              <a:rPr lang="en-US" i="1" dirty="0" smtClean="0"/>
-              <a:t>b </a:t>
-            </a:r>
-            <a:r>
-              <a:rPr lang="en-US" dirty="0" smtClean="0"/>
-              <a:t>and </a:t>
-            </a:r>
-            <a:r>
-              <a:rPr lang="en-US" i="1" dirty="0" smtClean="0"/>
-              <a:t>e</a:t>
-            </a:r>
-            <a:r>
-              <a:rPr lang="en-US" dirty="0" smtClean="0"/>
-              <a:t>, where </a:t>
-            </a:r>
-            <a:r>
-              <a:rPr lang="en-US" i="1" dirty="0" smtClean="0"/>
-              <a:t>e</a:t>
-            </a:r>
-            <a:r>
-              <a:rPr lang="en-US" dirty="0" smtClean="0"/>
-              <a:t> also has link to </a:t>
-            </a:r>
-            <a:r>
-              <a:rPr lang="en-US" i="1" dirty="0" smtClean="0"/>
-              <a:t>1</a:t>
-            </a:r>
-            <a:endParaRPr lang="en-US" i="1" dirty="0"/>
-          </a:p>
-        </p:txBody>
-      </p:sp>
-      <p:graphicFrame>
-        <p:nvGraphicFramePr>
-          <p:cNvPr id="4" name="Table 3"/>
-          <p:cNvGraphicFramePr>
-            <a:graphicFrameLocks noGrp="1"/>
-          </p:cNvGraphicFramePr>
-          <p:nvPr>
-            <p:extLst>
-              <p:ext uri="{D42A27DB-BD31-4B8C-83A1-F6EECF244321}">
-                <p14:modId xmlns:p14="http://schemas.microsoft.com/office/powerpoint/2010/main" val="2494123472"/>
-              </p:ext>
-            </p:extLst>
-          </p:nvPr>
-        </p:nvGraphicFramePr>
-        <p:xfrm>
-          <a:off x="889970" y="3846494"/>
-          <a:ext cx="1219199" cy="1371600"/>
-        </p:xfrm>
-        <a:graphic>
-          <a:graphicData uri="http://schemas.openxmlformats.org/drawingml/2006/table">
-            <a:tbl>
-              <a:tblPr firstRow="1" bandRow="1">
-                <a:tableStyleId>{5C22544A-7EE6-4342-B048-85BDC9FD1C3A}</a:tableStyleId>
-              </a:tblPr>
-              <a:tblGrid>
-                <a:gridCol w="1219199">
-                  <a:extLst>
-                    <a:ext uri="{9D8B030D-6E8A-4147-A177-3AD203B41FA5}">
-                      <a16:colId xmlns:a16="http://schemas.microsoft.com/office/drawing/2014/main" val="1636146242"/>
-                    </a:ext>
-                  </a:extLst>
-                </a:gridCol>
-              </a:tblGrid>
-              <a:tr h="370840">
-                <a:tc>
-                  <a:txBody>
-                    <a:bodyPr/>
-                    <a:lstStyle/>
-                    <a:p>
-                      <a:pPr algn="ctr"/>
-                      <a:r>
-                        <a:rPr lang="en-US" sz="2400" dirty="0" smtClean="0"/>
-                        <a:t>X-PK</a:t>
-                      </a:r>
-                      <a:endParaRPr lang="en-US" sz="2400" dirty="0"/>
-                    </a:p>
-                  </a:txBody>
-                  <a:tcPr/>
-                </a:tc>
-                <a:extLst>
-                  <a:ext uri="{0D108BD9-81ED-4DB2-BD59-A6C34878D82A}">
-                    <a16:rowId xmlns:a16="http://schemas.microsoft.com/office/drawing/2014/main" val="3010766445"/>
-                  </a:ext>
-                </a:extLst>
-              </a:tr>
-              <a:tr h="370840">
-                <a:tc>
-                  <a:txBody>
-                    <a:bodyPr/>
-                    <a:lstStyle/>
-                    <a:p>
-                      <a:pPr algn="ctr"/>
-                      <a:r>
-                        <a:rPr lang="en-US" sz="2400" dirty="0" smtClean="0"/>
-                        <a:t>0</a:t>
-                      </a:r>
-                      <a:endParaRPr lang="en-US" sz="2400" dirty="0"/>
-                    </a:p>
-                  </a:txBody>
-                  <a:tcPr/>
-                </a:tc>
-                <a:extLst>
-                  <a:ext uri="{0D108BD9-81ED-4DB2-BD59-A6C34878D82A}">
-                    <a16:rowId xmlns:a16="http://schemas.microsoft.com/office/drawing/2014/main" val="4239011705"/>
-                  </a:ext>
-                </a:extLst>
-              </a:tr>
-              <a:tr h="370840">
-                <a:tc>
-                  <a:txBody>
-                    <a:bodyPr/>
-                    <a:lstStyle/>
-                    <a:p>
-                      <a:pPr algn="ctr"/>
-                      <a:r>
-                        <a:rPr lang="en-US" sz="2400" dirty="0" smtClean="0"/>
-                        <a:t>1</a:t>
-                      </a:r>
-                      <a:endParaRPr lang="en-US" sz="2400" dirty="0"/>
-                    </a:p>
-                  </a:txBody>
-                  <a:tcPr/>
-                </a:tc>
-                <a:extLst>
-                  <a:ext uri="{0D108BD9-81ED-4DB2-BD59-A6C34878D82A}">
-                    <a16:rowId xmlns:a16="http://schemas.microsoft.com/office/drawing/2014/main" val="3324439667"/>
-                  </a:ext>
-                </a:extLst>
-              </a:tr>
-            </a:tbl>
-          </a:graphicData>
-        </a:graphic>
-      </p:graphicFrame>
-      <p:graphicFrame>
-        <p:nvGraphicFramePr>
-          <p:cNvPr id="5" name="Table 4"/>
-          <p:cNvGraphicFramePr>
-            <a:graphicFrameLocks noGrp="1"/>
-          </p:cNvGraphicFramePr>
-          <p:nvPr>
-            <p:extLst>
-              <p:ext uri="{D42A27DB-BD31-4B8C-83A1-F6EECF244321}">
-                <p14:modId xmlns:p14="http://schemas.microsoft.com/office/powerpoint/2010/main" val="3748651641"/>
-              </p:ext>
-            </p:extLst>
-          </p:nvPr>
-        </p:nvGraphicFramePr>
-        <p:xfrm>
-          <a:off x="9593370" y="3846494"/>
-          <a:ext cx="1668379" cy="2743200"/>
-        </p:xfrm>
-        <a:graphic>
-          <a:graphicData uri="http://schemas.openxmlformats.org/drawingml/2006/table">
-            <a:tbl>
-              <a:tblPr firstRow="1" bandRow="1">
-                <a:tableStyleId>{00A15C55-8517-42AA-B614-E9B94910E393}</a:tableStyleId>
-              </a:tblPr>
-              <a:tblGrid>
-                <a:gridCol w="1668379">
-                  <a:extLst>
-                    <a:ext uri="{9D8B030D-6E8A-4147-A177-3AD203B41FA5}">
-                      <a16:colId xmlns:a16="http://schemas.microsoft.com/office/drawing/2014/main" val="3161174791"/>
-                    </a:ext>
-                  </a:extLst>
-                </a:gridCol>
-              </a:tblGrid>
-              <a:tr h="370840">
-                <a:tc>
-                  <a:txBody>
-                    <a:bodyPr/>
-                    <a:lstStyle/>
-                    <a:p>
-                      <a:pPr algn="ctr"/>
-                      <a:r>
-                        <a:rPr lang="en-US" sz="2400" dirty="0" smtClean="0"/>
-                        <a:t>Y-PK</a:t>
-                      </a:r>
-                      <a:endParaRPr lang="en-US" sz="2400" dirty="0"/>
-                    </a:p>
-                  </a:txBody>
-                  <a:tcPr/>
-                </a:tc>
-                <a:extLst>
-                  <a:ext uri="{0D108BD9-81ED-4DB2-BD59-A6C34878D82A}">
-                    <a16:rowId xmlns:a16="http://schemas.microsoft.com/office/drawing/2014/main" val="1018849219"/>
-                  </a:ext>
-                </a:extLst>
-              </a:tr>
-              <a:tr h="370840">
-                <a:tc>
-                  <a:txBody>
-                    <a:bodyPr/>
-                    <a:lstStyle/>
-                    <a:p>
-                      <a:pPr algn="ctr"/>
-                      <a:r>
-                        <a:rPr lang="en-US" sz="2400" dirty="0" smtClean="0"/>
-                        <a:t>a</a:t>
-                      </a:r>
-                      <a:endParaRPr lang="en-US" sz="2400" dirty="0"/>
-                    </a:p>
-                  </a:txBody>
-                  <a:tcPr/>
-                </a:tc>
-                <a:extLst>
-                  <a:ext uri="{0D108BD9-81ED-4DB2-BD59-A6C34878D82A}">
-                    <a16:rowId xmlns:a16="http://schemas.microsoft.com/office/drawing/2014/main" val="2415621694"/>
-                  </a:ext>
-                </a:extLst>
-              </a:tr>
-              <a:tr h="370840">
-                <a:tc>
-                  <a:txBody>
-                    <a:bodyPr/>
-                    <a:lstStyle/>
-                    <a:p>
-                      <a:pPr algn="ctr"/>
-                      <a:r>
-                        <a:rPr lang="en-US" sz="2400" dirty="0" smtClean="0"/>
-                        <a:t>b</a:t>
-                      </a:r>
-                      <a:endParaRPr lang="en-US" sz="2400" dirty="0"/>
-                    </a:p>
-                  </a:txBody>
-                  <a:tcPr/>
-                </a:tc>
-                <a:extLst>
-                  <a:ext uri="{0D108BD9-81ED-4DB2-BD59-A6C34878D82A}">
-                    <a16:rowId xmlns:a16="http://schemas.microsoft.com/office/drawing/2014/main" val="3368192205"/>
-                  </a:ext>
-                </a:extLst>
-              </a:tr>
-              <a:tr h="370840">
-                <a:tc>
-                  <a:txBody>
-                    <a:bodyPr/>
-                    <a:lstStyle/>
-                    <a:p>
-                      <a:pPr algn="ctr"/>
-                      <a:r>
-                        <a:rPr lang="en-US" sz="2400" dirty="0" smtClean="0"/>
-                        <a:t>c</a:t>
-                      </a:r>
-                      <a:endParaRPr lang="en-US" sz="2400" dirty="0"/>
-                    </a:p>
-                  </a:txBody>
-                  <a:tcPr/>
-                </a:tc>
-                <a:extLst>
-                  <a:ext uri="{0D108BD9-81ED-4DB2-BD59-A6C34878D82A}">
-                    <a16:rowId xmlns:a16="http://schemas.microsoft.com/office/drawing/2014/main" val="1690100288"/>
-                  </a:ext>
-                </a:extLst>
-              </a:tr>
-              <a:tr h="370840">
-                <a:tc>
-                  <a:txBody>
-                    <a:bodyPr/>
-                    <a:lstStyle/>
-                    <a:p>
-                      <a:pPr algn="ctr"/>
-                      <a:r>
-                        <a:rPr lang="en-US" sz="2400" dirty="0" smtClean="0"/>
-                        <a:t>d</a:t>
-                      </a:r>
-                      <a:endParaRPr lang="en-US" sz="2400" dirty="0"/>
-                    </a:p>
-                  </a:txBody>
-                  <a:tcPr/>
-                </a:tc>
-                <a:extLst>
-                  <a:ext uri="{0D108BD9-81ED-4DB2-BD59-A6C34878D82A}">
-                    <a16:rowId xmlns:a16="http://schemas.microsoft.com/office/drawing/2014/main" val="1833299649"/>
-                  </a:ext>
-                </a:extLst>
-              </a:tr>
-              <a:tr h="370840">
-                <a:tc>
-                  <a:txBody>
-                    <a:bodyPr/>
-                    <a:lstStyle/>
-                    <a:p>
-                      <a:pPr algn="ctr"/>
-                      <a:r>
-                        <a:rPr lang="en-US" sz="2400" dirty="0" smtClean="0"/>
-                        <a:t>e</a:t>
-                      </a:r>
-                      <a:endParaRPr lang="en-US" sz="2400" dirty="0"/>
-                    </a:p>
-                  </a:txBody>
-                  <a:tcPr/>
-                </a:tc>
-                <a:extLst>
-                  <a:ext uri="{0D108BD9-81ED-4DB2-BD59-A6C34878D82A}">
-                    <a16:rowId xmlns:a16="http://schemas.microsoft.com/office/drawing/2014/main" val="928400680"/>
-                  </a:ext>
-                </a:extLst>
-              </a:tr>
-            </a:tbl>
-          </a:graphicData>
-        </a:graphic>
-      </p:graphicFrame>
-      <p:graphicFrame>
-        <p:nvGraphicFramePr>
-          <p:cNvPr id="6" name="Table 5"/>
-          <p:cNvGraphicFramePr>
-            <a:graphicFrameLocks noGrp="1"/>
-          </p:cNvGraphicFramePr>
-          <p:nvPr>
-            <p:extLst>
-              <p:ext uri="{D42A27DB-BD31-4B8C-83A1-F6EECF244321}">
-                <p14:modId xmlns:p14="http://schemas.microsoft.com/office/powerpoint/2010/main" val="275498510"/>
-              </p:ext>
-            </p:extLst>
-          </p:nvPr>
-        </p:nvGraphicFramePr>
-        <p:xfrm>
-          <a:off x="4177294" y="3846494"/>
-          <a:ext cx="3028996" cy="1828800"/>
-        </p:xfrm>
-        <a:graphic>
-          <a:graphicData uri="http://schemas.openxmlformats.org/drawingml/2006/table">
-            <a:tbl>
-              <a:tblPr firstRow="1" bandRow="1">
-                <a:tableStyleId>{073A0DAA-6AF3-43AB-8588-CEC1D06C72B9}</a:tableStyleId>
-              </a:tblPr>
-              <a:tblGrid>
-                <a:gridCol w="1514498">
-                  <a:extLst>
-                    <a:ext uri="{9D8B030D-6E8A-4147-A177-3AD203B41FA5}">
-                      <a16:colId xmlns:a16="http://schemas.microsoft.com/office/drawing/2014/main" val="3894862203"/>
-                    </a:ext>
-                  </a:extLst>
-                </a:gridCol>
-                <a:gridCol w="1514498">
-                  <a:extLst>
-                    <a:ext uri="{9D8B030D-6E8A-4147-A177-3AD203B41FA5}">
-                      <a16:colId xmlns:a16="http://schemas.microsoft.com/office/drawing/2014/main" val="2530556966"/>
-                    </a:ext>
-                  </a:extLst>
-                </a:gridCol>
-              </a:tblGrid>
-              <a:tr h="370840">
-                <a:tc>
-                  <a:txBody>
-                    <a:bodyPr/>
-                    <a:lstStyle/>
-                    <a:p>
-                      <a:pPr algn="ctr"/>
-                      <a:r>
-                        <a:rPr lang="en-US" sz="2400" dirty="0" smtClean="0"/>
-                        <a:t>FK-to-X</a:t>
-                      </a:r>
-                      <a:endParaRPr lang="en-US" sz="2400" dirty="0"/>
-                    </a:p>
-                  </a:txBody>
-                  <a:tcPr/>
-                </a:tc>
-                <a:tc>
-                  <a:txBody>
-                    <a:bodyPr/>
-                    <a:lstStyle/>
-                    <a:p>
-                      <a:pPr algn="ctr"/>
-                      <a:r>
-                        <a:rPr lang="en-US" sz="2400" dirty="0" smtClean="0"/>
-                        <a:t>FK-to-Y</a:t>
-                      </a:r>
-                      <a:endParaRPr lang="en-US" sz="2400" dirty="0"/>
-                    </a:p>
-                  </a:txBody>
-                  <a:tcPr/>
-                </a:tc>
-                <a:extLst>
-                  <a:ext uri="{0D108BD9-81ED-4DB2-BD59-A6C34878D82A}">
-                    <a16:rowId xmlns:a16="http://schemas.microsoft.com/office/drawing/2014/main" val="3456338148"/>
-                  </a:ext>
-                </a:extLst>
-              </a:tr>
-              <a:tr h="370840">
-                <a:tc>
-                  <a:txBody>
-                    <a:bodyPr/>
-                    <a:lstStyle/>
-                    <a:p>
-                      <a:pPr algn="ctr"/>
-                      <a:r>
-                        <a:rPr lang="en-US" sz="2400" dirty="0" smtClean="0"/>
-                        <a:t>0</a:t>
-                      </a:r>
-                      <a:endParaRPr lang="en-US" sz="2400" dirty="0"/>
-                    </a:p>
-                  </a:txBody>
-                  <a:tcPr/>
-                </a:tc>
-                <a:tc>
-                  <a:txBody>
-                    <a:bodyPr/>
-                    <a:lstStyle/>
-                    <a:p>
-                      <a:pPr algn="ctr"/>
-                      <a:r>
-                        <a:rPr lang="en-US" sz="2400" dirty="0" smtClean="0"/>
-                        <a:t>b</a:t>
-                      </a:r>
-                      <a:endParaRPr lang="en-US" sz="2400" dirty="0"/>
-                    </a:p>
-                  </a:txBody>
-                  <a:tcPr/>
-                </a:tc>
-                <a:extLst>
-                  <a:ext uri="{0D108BD9-81ED-4DB2-BD59-A6C34878D82A}">
-                    <a16:rowId xmlns:a16="http://schemas.microsoft.com/office/drawing/2014/main" val="1574440097"/>
-                  </a:ext>
-                </a:extLst>
-              </a:tr>
-              <a:tr h="370840">
-                <a:tc>
-                  <a:txBody>
-                    <a:bodyPr/>
-                    <a:lstStyle/>
-                    <a:p>
-                      <a:pPr algn="ctr"/>
-                      <a:r>
-                        <a:rPr lang="en-US" sz="2400" dirty="0" smtClean="0"/>
-                        <a:t>0</a:t>
-                      </a:r>
-                      <a:endParaRPr lang="en-US" sz="2400" dirty="0"/>
-                    </a:p>
-                  </a:txBody>
-                  <a:tcPr/>
-                </a:tc>
-                <a:tc>
-                  <a:txBody>
-                    <a:bodyPr/>
-                    <a:lstStyle/>
-                    <a:p>
-                      <a:pPr algn="ctr"/>
-                      <a:r>
-                        <a:rPr lang="en-US" sz="2400" dirty="0" smtClean="0"/>
-                        <a:t>e</a:t>
-                      </a:r>
-                      <a:endParaRPr lang="en-US" sz="2400" dirty="0"/>
-                    </a:p>
-                  </a:txBody>
-                  <a:tcPr/>
-                </a:tc>
-                <a:extLst>
-                  <a:ext uri="{0D108BD9-81ED-4DB2-BD59-A6C34878D82A}">
-                    <a16:rowId xmlns:a16="http://schemas.microsoft.com/office/drawing/2014/main" val="3192370104"/>
-                  </a:ext>
-                </a:extLst>
-              </a:tr>
-              <a:tr h="370840">
-                <a:tc>
-                  <a:txBody>
-                    <a:bodyPr/>
-                    <a:lstStyle/>
-                    <a:p>
-                      <a:pPr algn="ctr"/>
-                      <a:r>
-                        <a:rPr lang="en-US" sz="2400" dirty="0" smtClean="0"/>
-                        <a:t>1</a:t>
-                      </a:r>
-                      <a:endParaRPr lang="en-US" sz="2400" dirty="0"/>
-                    </a:p>
-                  </a:txBody>
-                  <a:tcPr/>
-                </a:tc>
-                <a:tc>
-                  <a:txBody>
-                    <a:bodyPr/>
-                    <a:lstStyle/>
-                    <a:p>
-                      <a:pPr algn="ctr"/>
-                      <a:r>
-                        <a:rPr lang="en-US" sz="2400" dirty="0" smtClean="0"/>
-                        <a:t>e</a:t>
-                      </a:r>
-                      <a:endParaRPr lang="en-US" sz="2400" dirty="0"/>
-                    </a:p>
-                  </a:txBody>
-                  <a:tcPr/>
-                </a:tc>
-                <a:extLst>
-                  <a:ext uri="{0D108BD9-81ED-4DB2-BD59-A6C34878D82A}">
-                    <a16:rowId xmlns:a16="http://schemas.microsoft.com/office/drawing/2014/main" val="620129750"/>
-                  </a:ext>
-                </a:extLst>
-              </a:tr>
-            </a:tbl>
-          </a:graphicData>
-        </a:graphic>
-      </p:graphicFrame>
-      <p:cxnSp>
-        <p:nvCxnSpPr>
-          <p:cNvPr id="7" name="Straight Arrow Connector 6"/>
-          <p:cNvCxnSpPr/>
-          <p:nvPr/>
-        </p:nvCxnSpPr>
-        <p:spPr>
-          <a:xfrm flipH="1">
-            <a:off x="2232621" y="4528927"/>
-            <a:ext cx="1872311" cy="0"/>
-          </a:xfrm>
-          <a:prstGeom prst="straightConnector1">
-            <a:avLst/>
-          </a:prstGeom>
-          <a:ln w="57150">
-            <a:tailEnd type="triangle"/>
-          </a:ln>
-        </p:spPr>
-        <p:style>
-          <a:lnRef idx="1">
-            <a:schemeClr val="dk1"/>
-          </a:lnRef>
-          <a:fillRef idx="0">
-            <a:schemeClr val="dk1"/>
-          </a:fillRef>
-          <a:effectRef idx="0">
-            <a:schemeClr val="dk1"/>
-          </a:effectRef>
-          <a:fontRef idx="minor">
-            <a:schemeClr val="tx1"/>
-          </a:fontRef>
-        </p:style>
-      </p:cxnSp>
-      <p:cxnSp>
-        <p:nvCxnSpPr>
-          <p:cNvPr id="8" name="Straight Arrow Connector 7"/>
-          <p:cNvCxnSpPr/>
-          <p:nvPr/>
-        </p:nvCxnSpPr>
-        <p:spPr>
-          <a:xfrm flipH="1" flipV="1">
-            <a:off x="2232620" y="4681328"/>
-            <a:ext cx="1872312" cy="331427"/>
-          </a:xfrm>
-          <a:prstGeom prst="straightConnector1">
-            <a:avLst/>
-          </a:prstGeom>
-          <a:ln w="57150">
-            <a:tailEnd type="triangle"/>
-          </a:ln>
-        </p:spPr>
-        <p:style>
-          <a:lnRef idx="1">
-            <a:schemeClr val="dk1"/>
-          </a:lnRef>
-          <a:fillRef idx="0">
-            <a:schemeClr val="dk1"/>
-          </a:fillRef>
-          <a:effectRef idx="0">
-            <a:schemeClr val="dk1"/>
-          </a:effectRef>
-          <a:fontRef idx="minor">
-            <a:schemeClr val="tx1"/>
-          </a:fontRef>
-        </p:style>
-      </p:cxnSp>
-      <p:cxnSp>
-        <p:nvCxnSpPr>
-          <p:cNvPr id="9" name="Straight Arrow Connector 8"/>
-          <p:cNvCxnSpPr/>
-          <p:nvPr/>
-        </p:nvCxnSpPr>
-        <p:spPr>
-          <a:xfrm flipH="1" flipV="1">
-            <a:off x="2232620" y="5119105"/>
-            <a:ext cx="1872312" cy="321247"/>
-          </a:xfrm>
-          <a:prstGeom prst="straightConnector1">
-            <a:avLst/>
-          </a:prstGeom>
-          <a:ln w="57150">
-            <a:tailEnd type="triangle"/>
-          </a:ln>
-        </p:spPr>
-        <p:style>
-          <a:lnRef idx="1">
-            <a:schemeClr val="dk1"/>
-          </a:lnRef>
-          <a:fillRef idx="0">
-            <a:schemeClr val="dk1"/>
-          </a:fillRef>
-          <a:effectRef idx="0">
-            <a:schemeClr val="dk1"/>
-          </a:effectRef>
-          <a:fontRef idx="minor">
-            <a:schemeClr val="tx1"/>
-          </a:fontRef>
-        </p:style>
-      </p:cxnSp>
-      <p:cxnSp>
-        <p:nvCxnSpPr>
-          <p:cNvPr id="16" name="Straight Arrow Connector 15"/>
-          <p:cNvCxnSpPr/>
-          <p:nvPr/>
-        </p:nvCxnSpPr>
-        <p:spPr>
-          <a:xfrm>
-            <a:off x="7278652" y="4528146"/>
-            <a:ext cx="2178215" cy="438560"/>
-          </a:xfrm>
-          <a:prstGeom prst="straightConnector1">
-            <a:avLst/>
-          </a:prstGeom>
-          <a:ln w="57150">
-            <a:tailEnd type="triangle"/>
-          </a:ln>
-        </p:spPr>
-        <p:style>
-          <a:lnRef idx="1">
-            <a:schemeClr val="dk1"/>
-          </a:lnRef>
-          <a:fillRef idx="0">
-            <a:schemeClr val="dk1"/>
-          </a:fillRef>
-          <a:effectRef idx="0">
-            <a:schemeClr val="dk1"/>
-          </a:effectRef>
-          <a:fontRef idx="minor">
-            <a:schemeClr val="tx1"/>
-          </a:fontRef>
-        </p:style>
-      </p:cxnSp>
-      <p:cxnSp>
-        <p:nvCxnSpPr>
-          <p:cNvPr id="18" name="Straight Arrow Connector 17"/>
-          <p:cNvCxnSpPr/>
-          <p:nvPr/>
-        </p:nvCxnSpPr>
-        <p:spPr>
-          <a:xfrm>
-            <a:off x="7278652" y="5440352"/>
-            <a:ext cx="2178215" cy="1013076"/>
-          </a:xfrm>
-          <a:prstGeom prst="straightConnector1">
-            <a:avLst/>
-          </a:prstGeom>
-          <a:ln w="57150">
-            <a:tailEnd type="triangle"/>
-          </a:ln>
-        </p:spPr>
-        <p:style>
-          <a:lnRef idx="1">
-            <a:schemeClr val="dk1"/>
-          </a:lnRef>
-          <a:fillRef idx="0">
-            <a:schemeClr val="dk1"/>
-          </a:fillRef>
-          <a:effectRef idx="0">
-            <a:schemeClr val="dk1"/>
-          </a:effectRef>
-          <a:fontRef idx="minor">
-            <a:schemeClr val="tx1"/>
-          </a:fontRef>
-        </p:style>
-      </p:cxnSp>
-      <p:cxnSp>
-        <p:nvCxnSpPr>
-          <p:cNvPr id="19" name="Straight Arrow Connector 18"/>
-          <p:cNvCxnSpPr/>
-          <p:nvPr/>
-        </p:nvCxnSpPr>
-        <p:spPr>
-          <a:xfrm>
-            <a:off x="7278652" y="4966706"/>
-            <a:ext cx="2178215" cy="1328840"/>
-          </a:xfrm>
-          <a:prstGeom prst="straightConnector1">
-            <a:avLst/>
-          </a:prstGeom>
-          <a:ln w="57150">
-            <a:tailEnd type="triangle"/>
-          </a:ln>
-        </p:spPr>
-        <p:style>
-          <a:lnRef idx="1">
-            <a:schemeClr val="dk1"/>
-          </a:lnRef>
-          <a:fillRef idx="0">
-            <a:schemeClr val="dk1"/>
-          </a:fillRef>
-          <a:effectRef idx="0">
-            <a:schemeClr val="dk1"/>
-          </a:effectRef>
-          <a:fontRef idx="minor">
-            <a:schemeClr val="tx1"/>
-          </a:fontRef>
-        </p:style>
-      </p:cxnSp>
-    </p:spTree>
-    <p:extLst>
-      <p:ext uri="{BB962C8B-B14F-4D97-AF65-F5344CB8AC3E}">
-        <p14:creationId xmlns:p14="http://schemas.microsoft.com/office/powerpoint/2010/main" val="1517192088"/>
-      </p:ext>
-    </p:extLst>
-  </p:cSld>
-  <p:clrMapOvr>
-    <a:masterClrMapping/>
-  </p:clrMapOvr>
-</p:sld>
-</file>
-
-<file path=ppt/slides/slide8.xml><?xml version="1.0" encoding="utf-8"?>
-<p:sld xmlns:a="http://schemas.openxmlformats.org/drawingml/2006/main" xmlns:r="http://schemas.openxmlformats.org/officeDocument/2006/relationships" xmlns:p="http://schemas.openxmlformats.org/presentationml/2006/main">
-  <p:cSld>
-    <p:spTree>
-      <p:nvGrpSpPr>
-        <p:cNvPr id="1" name=""/>
-        <p:cNvGrpSpPr/>
-        <p:nvPr/>
-      </p:nvGrpSpPr>
-      <p:grpSpPr>
-        <a:xfrm>
-          <a:off x="0" y="0"/>
-          <a:ext cx="0" cy="0"/>
-          <a:chOff x="0" y="0"/>
-          <a:chExt cx="0" cy="0"/>
-        </a:xfrm>
-      </p:grpSpPr>
-      <p:sp>
-        <p:nvSpPr>
-          <p:cNvPr id="2" name="Title 1"/>
-          <p:cNvSpPr>
-            <a:spLocks noGrp="1"/>
-          </p:cNvSpPr>
-          <p:nvPr>
-            <p:ph type="title"/>
-          </p:nvPr>
-        </p:nvSpPr>
-        <p:spPr/>
-        <p:txBody>
-          <a:bodyPr/>
-          <a:lstStyle/>
-          <a:p>
-            <a:r>
-              <a:rPr lang="en-US" dirty="0" err="1" smtClean="0"/>
-              <a:t>EntityManager</a:t>
-            </a:r>
-            <a:endParaRPr lang="en-US" dirty="0"/>
-          </a:p>
-        </p:txBody>
-      </p:sp>
-      <p:sp>
-        <p:nvSpPr>
-          <p:cNvPr id="3" name="Content Placeholder 2"/>
-          <p:cNvSpPr>
-            <a:spLocks noGrp="1"/>
-          </p:cNvSpPr>
-          <p:nvPr>
-            <p:ph idx="1"/>
-          </p:nvPr>
-        </p:nvSpPr>
-        <p:spPr>
-          <a:xfrm>
-            <a:off x="257907" y="1825625"/>
-            <a:ext cx="11570677" cy="4351338"/>
-          </a:xfrm>
-        </p:spPr>
-        <p:txBody>
-          <a:bodyPr>
-            <a:normAutofit/>
-          </a:bodyPr>
-          <a:lstStyle/>
-          <a:p>
-            <a:r>
-              <a:rPr lang="en-US" dirty="0" smtClean="0"/>
-              <a:t>Object used to sync the entities with the data in the DB</a:t>
-            </a:r>
-          </a:p>
-          <a:p>
-            <a:r>
-              <a:rPr lang="en-US" dirty="0" smtClean="0"/>
-              <a:t>Different operations</a:t>
-            </a:r>
-          </a:p>
-          <a:p>
-            <a:pPr lvl="1"/>
-            <a:r>
-              <a:rPr lang="en-US" i="1" dirty="0"/>
-              <a:t>p</a:t>
-            </a:r>
-            <a:r>
-              <a:rPr lang="en-US" i="1" dirty="0" smtClean="0"/>
-              <a:t>ersist()</a:t>
-            </a:r>
-          </a:p>
-          <a:p>
-            <a:pPr lvl="1"/>
-            <a:r>
-              <a:rPr lang="en-US" i="1" dirty="0"/>
-              <a:t>c</a:t>
-            </a:r>
-            <a:r>
-              <a:rPr lang="en-US" i="1" dirty="0" smtClean="0"/>
-              <a:t>lear()</a:t>
-            </a:r>
-          </a:p>
-          <a:p>
-            <a:pPr lvl="1"/>
-            <a:r>
-              <a:rPr lang="en-US" i="1" dirty="0"/>
-              <a:t>f</a:t>
-            </a:r>
-            <a:r>
-              <a:rPr lang="en-US" i="1" dirty="0" smtClean="0"/>
-              <a:t>ind()</a:t>
-            </a:r>
-          </a:p>
-          <a:p>
-            <a:pPr lvl="1"/>
-            <a:r>
-              <a:rPr lang="en-US" i="1" dirty="0" smtClean="0"/>
-              <a:t>contains()</a:t>
-            </a:r>
-          </a:p>
-          <a:p>
-            <a:pPr lvl="1"/>
-            <a:r>
-              <a:rPr lang="en-US" i="1" dirty="0"/>
-              <a:t>m</a:t>
-            </a:r>
-            <a:r>
-              <a:rPr lang="en-US" i="1" dirty="0" smtClean="0"/>
-              <a:t>erge()</a:t>
-            </a:r>
-          </a:p>
-          <a:p>
-            <a:pPr lvl="1"/>
-            <a:r>
-              <a:rPr lang="en-US" i="1" dirty="0"/>
-              <a:t>r</a:t>
-            </a:r>
-            <a:r>
-              <a:rPr lang="en-US" i="1" dirty="0" smtClean="0"/>
-              <a:t>emove()</a:t>
-            </a:r>
-          </a:p>
-          <a:p>
-            <a:pPr lvl="1"/>
-            <a:r>
-              <a:rPr lang="en-US" dirty="0"/>
-              <a:t>e</a:t>
-            </a:r>
-            <a:r>
-              <a:rPr lang="en-US" dirty="0" smtClean="0"/>
-              <a:t>tc.</a:t>
-            </a:r>
-            <a:endParaRPr lang="en-US" dirty="0"/>
-          </a:p>
-        </p:txBody>
-      </p:sp>
-    </p:spTree>
-    <p:extLst>
-      <p:ext uri="{BB962C8B-B14F-4D97-AF65-F5344CB8AC3E}">
-        <p14:creationId xmlns:p14="http://schemas.microsoft.com/office/powerpoint/2010/main" val="1778239703"/>
-      </p:ext>
-    </p:extLst>
-  </p:cSld>
-  <p:clrMapOvr>
-    <a:masterClrMapping/>
-  </p:clrMapOvr>
-</p:sld>
-</file>
-
 <file path=ppt/slides/slide9.xml><?xml version="1.0" encoding="utf-8"?>
 <p:sld xmlns:a="http://schemas.openxmlformats.org/drawingml/2006/main" xmlns:r="http://schemas.openxmlformats.org/officeDocument/2006/relationships" xmlns:p="http://schemas.openxmlformats.org/presentationml/2006/main">
   <p:cSld>
@@ -7102,59 +7930,33 @@
             <p:ph type="title"/>
           </p:nvPr>
         </p:nvSpPr>
+        <p:spPr/>
+        <p:txBody>
+          <a:bodyPr/>
+          <a:lstStyle/>
+          <a:p>
+            <a:r>
+              <a:rPr lang="en-US" dirty="0" err="1" smtClean="0"/>
+              <a:t>EntityManager</a:t>
+            </a:r>
+            <a:endParaRPr lang="en-US" dirty="0"/>
+          </a:p>
+        </p:txBody>
+      </p:sp>
+      <p:sp>
+        <p:nvSpPr>
+          <p:cNvPr id="3" name="Content Placeholder 2"/>
+          <p:cNvSpPr>
+            <a:spLocks noGrp="1"/>
+          </p:cNvSpPr>
+          <p:nvPr>
+            <p:ph idx="1"/>
+          </p:nvPr>
+        </p:nvSpPr>
         <p:spPr>
           <a:xfrm>
-            <a:off x="293077" y="365125"/>
-            <a:ext cx="11687908" cy="1325563"/>
-          </a:xfrm>
-        </p:spPr>
-        <p:txBody>
-          <a:bodyPr>
-            <a:noAutofit/>
-          </a:bodyPr>
-          <a:lstStyle/>
-          <a:p>
-            <a:r>
-              <a:rPr lang="en-US" sz="5400" b="1" dirty="0"/>
-              <a:t>Java Persistence </a:t>
-            </a:r>
-            <a:r>
-              <a:rPr lang="en-US" sz="5400" b="1" dirty="0" smtClean="0"/>
-              <a:t>query language</a:t>
-            </a:r>
-            <a:r>
-              <a:rPr lang="en-US" sz="5400" dirty="0"/>
-              <a:t> </a:t>
-            </a:r>
-            <a:r>
-              <a:rPr lang="en-US" sz="5400" dirty="0" smtClean="0"/>
-              <a:t>(</a:t>
-            </a:r>
-            <a:r>
-              <a:rPr lang="en-US" sz="5400" b="1" dirty="0"/>
-              <a:t>JPQL</a:t>
-            </a:r>
-            <a:r>
-              <a:rPr lang="en-US" sz="5400" dirty="0"/>
-              <a:t>) </a:t>
-            </a:r>
-          </a:p>
-        </p:txBody>
-      </p:sp>
-      <p:sp>
-        <p:nvSpPr>
-          <p:cNvPr id="3" name="Content Placeholder 2"/>
-          <p:cNvSpPr>
-            <a:spLocks noGrp="1"/>
-          </p:cNvSpPr>
-          <p:nvPr>
-            <p:ph idx="1"/>
-          </p:nvPr>
-        </p:nvSpPr>
-        <p:spPr>
-          <a:xfrm>
-            <a:off x="374073" y="1825624"/>
-            <a:ext cx="11463251" cy="4799619"/>
+            <a:off x="257907" y="1825625"/>
+            <a:ext cx="11570677" cy="4351338"/>
           </a:xfrm>
         </p:spPr>
         <p:txBody>
@@ -7165,69 +7967,87 @@
           <a:p>
             <a:r>
               <a:rPr lang="en-US" dirty="0" smtClean="0"/>
-              <a:t>You can use </a:t>
-            </a:r>
-            <a:r>
-              <a:rPr lang="en-US" i="1" dirty="0" err="1" smtClean="0"/>
-              <a:t>EntityManager#find</a:t>
+              <a:t>Object used to sync the entities with the data in the DB</a:t>
+            </a:r>
+          </a:p>
+          <a:p>
+            <a:r>
+              <a:rPr lang="en-US" dirty="0" smtClean="0"/>
+              <a:t>Different operations</a:t>
+            </a:r>
+          </a:p>
+          <a:p>
+            <a:pPr lvl="1"/>
+            <a:r>
+              <a:rPr lang="en-US" i="1" dirty="0"/>
+              <a:t>p</a:t>
             </a:r>
             <a:r>
               <a:rPr lang="en-US" i="1" dirty="0" smtClean="0"/>
-              <a:t>(id) </a:t>
-            </a:r>
-            <a:r>
-              <a:rPr lang="en-US" dirty="0" smtClean="0"/>
-              <a:t>to query an </a:t>
+              <a:t>ersist()</a:t>
+            </a:r>
+          </a:p>
+          <a:p>
+            <a:pPr lvl="1"/>
+            <a:r>
+              <a:rPr lang="en-US" i="1" dirty="0"/>
+              <a:t>c</a:t>
             </a:r>
             <a:r>
               <a:rPr lang="en-US" i="1" dirty="0" smtClean="0"/>
-              <a:t>@Entity</a:t>
-            </a:r>
-            <a:r>
-              <a:rPr lang="en-US" dirty="0" smtClean="0"/>
-              <a:t> with a given </a:t>
+              <a:t>lear()</a:t>
+            </a:r>
+          </a:p>
+          <a:p>
+            <a:pPr lvl="1"/>
+            <a:r>
+              <a:rPr lang="en-US" i="1" dirty="0"/>
+              <a:t>f</a:t>
             </a:r>
             <a:r>
               <a:rPr lang="en-US" i="1" dirty="0" smtClean="0"/>
-              <a:t>id</a:t>
-            </a:r>
-          </a:p>
-          <a:p>
-            <a:r>
-              <a:rPr lang="en-US" dirty="0" smtClean="0"/>
-              <a:t>But what if you need to find all quizzes in a given category?</a:t>
-            </a:r>
-          </a:p>
-          <a:p>
-            <a:r>
-              <a:rPr lang="en-US" dirty="0" smtClean="0"/>
-              <a:t>You can of course use SQL</a:t>
-            </a:r>
-          </a:p>
-          <a:p>
-            <a:r>
-              <a:rPr lang="en-US" dirty="0" smtClean="0"/>
-              <a:t>JPQL: similar to SQL in syntax, but works by referring directly to </a:t>
-            </a:r>
+              <a:t>ind()</a:t>
+            </a:r>
+          </a:p>
+          <a:p>
+            <a:pPr lvl="1"/>
             <a:r>
               <a:rPr lang="en-US" i="1" dirty="0" smtClean="0"/>
-              <a:t>@Entity</a:t>
-            </a:r>
-            <a:r>
-              <a:rPr lang="en-US" dirty="0" smtClean="0"/>
-              <a:t>, and not tables in DB </a:t>
-            </a:r>
-          </a:p>
-          <a:p>
-            <a:r>
-              <a:rPr lang="en-US" dirty="0" smtClean="0"/>
-              <a:t>JPA will translate JPQL into SQL at runtime</a:t>
-            </a:r>
-          </a:p>
-          <a:p>
-            <a:endParaRPr lang="en-US" dirty="0" smtClean="0"/>
-          </a:p>
-          <a:p>
+              <a:t>contains()</a:t>
+            </a:r>
+          </a:p>
+          <a:p>
+            <a:pPr lvl="1"/>
+            <a:r>
+              <a:rPr lang="en-US" i="1" dirty="0"/>
+              <a:t>m</a:t>
+            </a:r>
+            <a:r>
+              <a:rPr lang="en-US" i="1" dirty="0" smtClean="0"/>
+              <a:t>erge()</a:t>
+            </a:r>
+          </a:p>
+          <a:p>
+            <a:pPr lvl="1"/>
+            <a:r>
+              <a:rPr lang="en-US" i="1" dirty="0"/>
+              <a:t>r</a:t>
+            </a:r>
+            <a:r>
+              <a:rPr lang="en-US" i="1" dirty="0" smtClean="0"/>
+              <a:t>emove()</a:t>
+            </a:r>
+          </a:p>
+          <a:p>
+            <a:pPr lvl="1"/>
+            <a:r>
+              <a:rPr lang="en-US" dirty="0"/>
+              <a:t>e</a:t>
+            </a:r>
+            <a:r>
+              <a:rPr lang="en-US" dirty="0" smtClean="0"/>
+              <a:t>tc.</a:t>
+            </a:r>
             <a:endParaRPr lang="en-US" dirty="0"/>
           </a:p>
         </p:txBody>
@@ -7235,7 +8055,7 @@
     </p:spTree>
     <p:extLst>
       <p:ext uri="{BB962C8B-B14F-4D97-AF65-F5344CB8AC3E}">
-        <p14:creationId xmlns:p14="http://schemas.microsoft.com/office/powerpoint/2010/main" val="1194937673"/>
+        <p14:creationId xmlns:p14="http://schemas.microsoft.com/office/powerpoint/2010/main" val="1778239703"/>
       </p:ext>
     </p:extLst>
   </p:cSld>

</xml_diff>